<commit_message>
upload the graphic and ppt
</commit_message>
<xml_diff>
--- a/Presentation/Muster.pptx
+++ b/Presentation/Muster.pptx
@@ -5,11 +5,27 @@
     <p:sldMasterId id="2147483648" r:id="rId1"/>
   </p:sldMasterIdLst>
   <p:notesMasterIdLst>
-    <p:notesMasterId r:id="rId4"/>
+    <p:notesMasterId r:id="rId20"/>
   </p:notesMasterIdLst>
   <p:sldIdLst>
     <p:sldId id="280" r:id="rId2"/>
-    <p:sldId id="314" r:id="rId3"/>
+    <p:sldId id="316" r:id="rId3"/>
+    <p:sldId id="315" r:id="rId4"/>
+    <p:sldId id="317" r:id="rId5"/>
+    <p:sldId id="318" r:id="rId6"/>
+    <p:sldId id="319" r:id="rId7"/>
+    <p:sldId id="320" r:id="rId8"/>
+    <p:sldId id="321" r:id="rId9"/>
+    <p:sldId id="322" r:id="rId10"/>
+    <p:sldId id="323" r:id="rId11"/>
+    <p:sldId id="324" r:id="rId12"/>
+    <p:sldId id="325" r:id="rId13"/>
+    <p:sldId id="326" r:id="rId14"/>
+    <p:sldId id="327" r:id="rId15"/>
+    <p:sldId id="328" r:id="rId16"/>
+    <p:sldId id="329" r:id="rId17"/>
+    <p:sldId id="330" r:id="rId18"/>
+    <p:sldId id="314" r:id="rId19"/>
   </p:sldIdLst>
   <p:sldSz cx="9144000" cy="6858000" type="screen4x3"/>
   <p:notesSz cx="6858000" cy="9144000"/>
@@ -155,6 +171,642 @@
     </p:ext>
   </p:extLst>
 </p:presentation>
+</file>
+
+<file path=ppt/revisionInfo.xml><?xml version="1.0" encoding="utf-8"?>
+<p1510:revInfo xmlns:a="http://schemas.openxmlformats.org/drawingml/2006/main" xmlns:r="http://schemas.openxmlformats.org/officeDocument/2006/relationships" xmlns:p1510="http://schemas.microsoft.com/office/powerpoint/2015/10/main">
+  <p1510:revLst>
+    <p1510:client id="{DB2031DC-E114-489A-848D-700AE726DFF6}" v="66" dt="2022-11-13T21:12:37.210"/>
+  </p1510:revLst>
+</p1510:revInfo>
+</file>
+
+<file path=ppt/changesInfos/changesInfo1.xml><?xml version="1.0" encoding="utf-8"?>
+<pc:chgInfo xmlns:a="http://schemas.openxmlformats.org/drawingml/2006/main" xmlns:r="http://schemas.openxmlformats.org/officeDocument/2006/relationships" xmlns:ac="http://schemas.microsoft.com/office/drawing/2013/main/command" xmlns:pc="http://schemas.microsoft.com/office/powerpoint/2013/main/command">
+  <pc:docChgLst>
+    <pc:chgData name="Ziqing Yu" userId="76dbd0bb75f3aa62" providerId="LiveId" clId="{DB2031DC-E114-489A-848D-700AE726DFF6}"/>
+    <pc:docChg chg="undo custSel addSld delSld modSld">
+      <pc:chgData name="Ziqing Yu" userId="76dbd0bb75f3aa62" providerId="LiveId" clId="{DB2031DC-E114-489A-848D-700AE726DFF6}" dt="2022-11-13T21:14:09.597" v="157" actId="20577"/>
+      <pc:docMkLst>
+        <pc:docMk/>
+      </pc:docMkLst>
+      <pc:sldChg chg="add del">
+        <pc:chgData name="Ziqing Yu" userId="76dbd0bb75f3aa62" providerId="LiveId" clId="{DB2031DC-E114-489A-848D-700AE726DFF6}" dt="2022-11-13T21:12:49.632" v="83" actId="47"/>
+        <pc:sldMkLst>
+          <pc:docMk/>
+          <pc:sldMk cId="0" sldId="314"/>
+        </pc:sldMkLst>
+      </pc:sldChg>
+      <pc:sldChg chg="addSp delSp modSp new mod">
+        <pc:chgData name="Ziqing Yu" userId="76dbd0bb75f3aa62" providerId="LiveId" clId="{DB2031DC-E114-489A-848D-700AE726DFF6}" dt="2022-11-13T21:13:09.591" v="98" actId="20577"/>
+        <pc:sldMkLst>
+          <pc:docMk/>
+          <pc:sldMk cId="3169940856" sldId="315"/>
+        </pc:sldMkLst>
+        <pc:spChg chg="mod">
+          <ac:chgData name="Ziqing Yu" userId="76dbd0bb75f3aa62" providerId="LiveId" clId="{DB2031DC-E114-489A-848D-700AE726DFF6}" dt="2022-11-13T21:13:09.591" v="98" actId="20577"/>
+          <ac:spMkLst>
+            <pc:docMk/>
+            <pc:sldMk cId="3169940856" sldId="315"/>
+            <ac:spMk id="2" creationId="{577C4C4A-CBE8-AACA-407C-459DDE866F41}"/>
+          </ac:spMkLst>
+        </pc:spChg>
+        <pc:spChg chg="del">
+          <ac:chgData name="Ziqing Yu" userId="76dbd0bb75f3aa62" providerId="LiveId" clId="{DB2031DC-E114-489A-848D-700AE726DFF6}" dt="2022-11-13T21:05:42.935" v="1"/>
+          <ac:spMkLst>
+            <pc:docMk/>
+            <pc:sldMk cId="3169940856" sldId="315"/>
+            <ac:spMk id="3" creationId="{5915778C-DC88-BD4D-AD52-2AC8D5EE16E9}"/>
+          </ac:spMkLst>
+        </pc:spChg>
+        <pc:spChg chg="add del mod">
+          <ac:chgData name="Ziqing Yu" userId="76dbd0bb75f3aa62" providerId="LiveId" clId="{DB2031DC-E114-489A-848D-700AE726DFF6}" dt="2022-11-13T21:06:29.817" v="28"/>
+          <ac:spMkLst>
+            <pc:docMk/>
+            <pc:sldMk cId="3169940856" sldId="315"/>
+            <ac:spMk id="7" creationId="{E01F789F-2CDB-459C-B981-CA929A9757C3}"/>
+          </ac:spMkLst>
+        </pc:spChg>
+        <pc:spChg chg="add del mod">
+          <ac:chgData name="Ziqing Yu" userId="76dbd0bb75f3aa62" providerId="LiveId" clId="{DB2031DC-E114-489A-848D-700AE726DFF6}" dt="2022-11-13T21:10:19.075" v="35"/>
+          <ac:spMkLst>
+            <pc:docMk/>
+            <pc:sldMk cId="3169940856" sldId="315"/>
+            <ac:spMk id="10" creationId="{B932B51C-984B-1330-C66A-043DEC5027CE}"/>
+          </ac:spMkLst>
+        </pc:spChg>
+        <pc:picChg chg="add del mod">
+          <ac:chgData name="Ziqing Yu" userId="76dbd0bb75f3aa62" providerId="LiveId" clId="{DB2031DC-E114-489A-848D-700AE726DFF6}" dt="2022-11-13T21:06:27.426" v="27" actId="478"/>
+          <ac:picMkLst>
+            <pc:docMk/>
+            <pc:sldMk cId="3169940856" sldId="315"/>
+            <ac:picMk id="6" creationId="{0761228D-345F-5C2C-1F4E-441897B9D4D2}"/>
+          </ac:picMkLst>
+        </pc:picChg>
+        <pc:picChg chg="add del mod">
+          <ac:chgData name="Ziqing Yu" userId="76dbd0bb75f3aa62" providerId="LiveId" clId="{DB2031DC-E114-489A-848D-700AE726DFF6}" dt="2022-11-13T21:10:11.177" v="34" actId="478"/>
+          <ac:picMkLst>
+            <pc:docMk/>
+            <pc:sldMk cId="3169940856" sldId="315"/>
+            <ac:picMk id="9" creationId="{F9576D69-A7E1-043F-20E6-1F27E18C2F9F}"/>
+          </ac:picMkLst>
+        </pc:picChg>
+        <pc:picChg chg="add mod">
+          <ac:chgData name="Ziqing Yu" userId="76dbd0bb75f3aa62" providerId="LiveId" clId="{DB2031DC-E114-489A-848D-700AE726DFF6}" dt="2022-11-13T21:10:20.574" v="36" actId="27614"/>
+          <ac:picMkLst>
+            <pc:docMk/>
+            <pc:sldMk cId="3169940856" sldId="315"/>
+            <ac:picMk id="12" creationId="{B7BC2482-AF17-637E-CE04-647879DF4C48}"/>
+          </ac:picMkLst>
+        </pc:picChg>
+      </pc:sldChg>
+      <pc:sldChg chg="addSp delSp modSp new mod">
+        <pc:chgData name="Ziqing Yu" userId="76dbd0bb75f3aa62" providerId="LiveId" clId="{DB2031DC-E114-489A-848D-700AE726DFF6}" dt="2022-11-13T21:13:05.559" v="93" actId="20577"/>
+        <pc:sldMkLst>
+          <pc:docMk/>
+          <pc:sldMk cId="3133153608" sldId="316"/>
+        </pc:sldMkLst>
+        <pc:spChg chg="mod">
+          <ac:chgData name="Ziqing Yu" userId="76dbd0bb75f3aa62" providerId="LiveId" clId="{DB2031DC-E114-489A-848D-700AE726DFF6}" dt="2022-11-13T21:13:05.559" v="93" actId="20577"/>
+          <ac:spMkLst>
+            <pc:docMk/>
+            <pc:sldMk cId="3133153608" sldId="316"/>
+            <ac:spMk id="2" creationId="{C8259257-40E8-4D41-0328-94AA32F21BAC}"/>
+          </ac:spMkLst>
+        </pc:spChg>
+        <pc:spChg chg="del">
+          <ac:chgData name="Ziqing Yu" userId="76dbd0bb75f3aa62" providerId="LiveId" clId="{DB2031DC-E114-489A-848D-700AE726DFF6}" dt="2022-11-13T21:10:07.049" v="31"/>
+          <ac:spMkLst>
+            <pc:docMk/>
+            <pc:sldMk cId="3133153608" sldId="316"/>
+            <ac:spMk id="3" creationId="{31ECFC88-7212-1163-04BC-1454239860A6}"/>
+          </ac:spMkLst>
+        </pc:spChg>
+        <pc:picChg chg="add mod">
+          <ac:chgData name="Ziqing Yu" userId="76dbd0bb75f3aa62" providerId="LiveId" clId="{DB2031DC-E114-489A-848D-700AE726DFF6}" dt="2022-11-13T21:10:08.347" v="33" actId="962"/>
+          <ac:picMkLst>
+            <pc:docMk/>
+            <pc:sldMk cId="3133153608" sldId="316"/>
+            <ac:picMk id="6" creationId="{1A038686-1F3A-C8B8-E5CD-CE841FD650E5}"/>
+          </ac:picMkLst>
+        </pc:picChg>
+      </pc:sldChg>
+      <pc:sldChg chg="addSp delSp modSp new mod">
+        <pc:chgData name="Ziqing Yu" userId="76dbd0bb75f3aa62" providerId="LiveId" clId="{DB2031DC-E114-489A-848D-700AE726DFF6}" dt="2022-11-13T21:13:14.733" v="105" actId="20577"/>
+        <pc:sldMkLst>
+          <pc:docMk/>
+          <pc:sldMk cId="2557793898" sldId="317"/>
+        </pc:sldMkLst>
+        <pc:spChg chg="mod">
+          <ac:chgData name="Ziqing Yu" userId="76dbd0bb75f3aa62" providerId="LiveId" clId="{DB2031DC-E114-489A-848D-700AE726DFF6}" dt="2022-11-13T21:13:14.733" v="105" actId="20577"/>
+          <ac:spMkLst>
+            <pc:docMk/>
+            <pc:sldMk cId="2557793898" sldId="317"/>
+            <ac:spMk id="2" creationId="{EF29CCBF-4086-FF13-3C2F-26F4D2EACF71}"/>
+          </ac:spMkLst>
+        </pc:spChg>
+        <pc:spChg chg="del">
+          <ac:chgData name="Ziqing Yu" userId="76dbd0bb75f3aa62" providerId="LiveId" clId="{DB2031DC-E114-489A-848D-700AE726DFF6}" dt="2022-11-13T21:10:33.668" v="37"/>
+          <ac:spMkLst>
+            <pc:docMk/>
+            <pc:sldMk cId="2557793898" sldId="317"/>
+            <ac:spMk id="3" creationId="{D72A56AA-DD5F-A7A3-299C-DDAE4C857C1F}"/>
+          </ac:spMkLst>
+        </pc:spChg>
+        <pc:spChg chg="add del mod">
+          <ac:chgData name="Ziqing Yu" userId="76dbd0bb75f3aa62" providerId="LiveId" clId="{DB2031DC-E114-489A-848D-700AE726DFF6}" dt="2022-11-13T21:10:40.008" v="41"/>
+          <ac:spMkLst>
+            <pc:docMk/>
+            <pc:sldMk cId="2557793898" sldId="317"/>
+            <ac:spMk id="7" creationId="{6777B845-54D2-3130-7280-29ECD7EBA06F}"/>
+          </ac:spMkLst>
+        </pc:spChg>
+        <pc:picChg chg="add del mod">
+          <ac:chgData name="Ziqing Yu" userId="76dbd0bb75f3aa62" providerId="LiveId" clId="{DB2031DC-E114-489A-848D-700AE726DFF6}" dt="2022-11-13T21:10:36.892" v="40" actId="478"/>
+          <ac:picMkLst>
+            <pc:docMk/>
+            <pc:sldMk cId="2557793898" sldId="317"/>
+            <ac:picMk id="6" creationId="{25631664-7FF0-F323-2A93-AFC0C20CA644}"/>
+          </ac:picMkLst>
+        </pc:picChg>
+        <pc:picChg chg="add mod">
+          <ac:chgData name="Ziqing Yu" userId="76dbd0bb75f3aa62" providerId="LiveId" clId="{DB2031DC-E114-489A-848D-700AE726DFF6}" dt="2022-11-13T21:10:42.458" v="42" actId="27614"/>
+          <ac:picMkLst>
+            <pc:docMk/>
+            <pc:sldMk cId="2557793898" sldId="317"/>
+            <ac:picMk id="9" creationId="{DC995623-89DC-B3B3-5F26-CD20201925B0}"/>
+          </ac:picMkLst>
+        </pc:picChg>
+      </pc:sldChg>
+      <pc:sldChg chg="addSp delSp modSp new mod">
+        <pc:chgData name="Ziqing Yu" userId="76dbd0bb75f3aa62" providerId="LiveId" clId="{DB2031DC-E114-489A-848D-700AE726DFF6}" dt="2022-11-13T21:13:18.398" v="112" actId="20577"/>
+        <pc:sldMkLst>
+          <pc:docMk/>
+          <pc:sldMk cId="2350780990" sldId="318"/>
+        </pc:sldMkLst>
+        <pc:spChg chg="mod">
+          <ac:chgData name="Ziqing Yu" userId="76dbd0bb75f3aa62" providerId="LiveId" clId="{DB2031DC-E114-489A-848D-700AE726DFF6}" dt="2022-11-13T21:13:18.398" v="112" actId="20577"/>
+          <ac:spMkLst>
+            <pc:docMk/>
+            <pc:sldMk cId="2350780990" sldId="318"/>
+            <ac:spMk id="2" creationId="{A111A785-56BE-63D2-71FD-668E46697B3E}"/>
+          </ac:spMkLst>
+        </pc:spChg>
+        <pc:spChg chg="del">
+          <ac:chgData name="Ziqing Yu" userId="76dbd0bb75f3aa62" providerId="LiveId" clId="{DB2031DC-E114-489A-848D-700AE726DFF6}" dt="2022-11-13T21:10:43.919" v="43"/>
+          <ac:spMkLst>
+            <pc:docMk/>
+            <pc:sldMk cId="2350780990" sldId="318"/>
+            <ac:spMk id="3" creationId="{3B7EBFB0-594D-DB85-71EF-87F9339B83BF}"/>
+          </ac:spMkLst>
+        </pc:spChg>
+        <pc:picChg chg="add mod">
+          <ac:chgData name="Ziqing Yu" userId="76dbd0bb75f3aa62" providerId="LiveId" clId="{DB2031DC-E114-489A-848D-700AE726DFF6}" dt="2022-11-13T21:10:44.811" v="45" actId="962"/>
+          <ac:picMkLst>
+            <pc:docMk/>
+            <pc:sldMk cId="2350780990" sldId="318"/>
+            <ac:picMk id="6" creationId="{21C028FB-D9A5-7740-29F4-7269C95D7BC0}"/>
+          </ac:picMkLst>
+        </pc:picChg>
+      </pc:sldChg>
+      <pc:sldChg chg="addSp delSp modSp new mod">
+        <pc:chgData name="Ziqing Yu" userId="76dbd0bb75f3aa62" providerId="LiveId" clId="{DB2031DC-E114-489A-848D-700AE726DFF6}" dt="2022-11-13T21:13:24.325" v="123" actId="20577"/>
+        <pc:sldMkLst>
+          <pc:docMk/>
+          <pc:sldMk cId="758564445" sldId="319"/>
+        </pc:sldMkLst>
+        <pc:spChg chg="mod">
+          <ac:chgData name="Ziqing Yu" userId="76dbd0bb75f3aa62" providerId="LiveId" clId="{DB2031DC-E114-489A-848D-700AE726DFF6}" dt="2022-11-13T21:13:24.325" v="123" actId="20577"/>
+          <ac:spMkLst>
+            <pc:docMk/>
+            <pc:sldMk cId="758564445" sldId="319"/>
+            <ac:spMk id="2" creationId="{EBE0E297-91EF-066D-47EF-BFE73830A7DB}"/>
+          </ac:spMkLst>
+        </pc:spChg>
+        <pc:spChg chg="del">
+          <ac:chgData name="Ziqing Yu" userId="76dbd0bb75f3aa62" providerId="LiveId" clId="{DB2031DC-E114-489A-848D-700AE726DFF6}" dt="2022-11-13T21:10:56.044" v="46"/>
+          <ac:spMkLst>
+            <pc:docMk/>
+            <pc:sldMk cId="758564445" sldId="319"/>
+            <ac:spMk id="3" creationId="{74E2D661-112F-08A4-B339-709217B076EF}"/>
+          </ac:spMkLst>
+        </pc:spChg>
+        <pc:picChg chg="add mod">
+          <ac:chgData name="Ziqing Yu" userId="76dbd0bb75f3aa62" providerId="LiveId" clId="{DB2031DC-E114-489A-848D-700AE726DFF6}" dt="2022-11-13T21:10:56.707" v="48" actId="962"/>
+          <ac:picMkLst>
+            <pc:docMk/>
+            <pc:sldMk cId="758564445" sldId="319"/>
+            <ac:picMk id="6" creationId="{DE71C3DC-3A1A-3419-3FAF-6C4758312FF0}"/>
+          </ac:picMkLst>
+        </pc:picChg>
+      </pc:sldChg>
+      <pc:sldChg chg="addSp delSp modSp add mod">
+        <pc:chgData name="Ziqing Yu" userId="76dbd0bb75f3aa62" providerId="LiveId" clId="{DB2031DC-E114-489A-848D-700AE726DFF6}" dt="2022-11-13T21:13:28.136" v="124"/>
+        <pc:sldMkLst>
+          <pc:docMk/>
+          <pc:sldMk cId="18036196" sldId="320"/>
+        </pc:sldMkLst>
+        <pc:spChg chg="mod">
+          <ac:chgData name="Ziqing Yu" userId="76dbd0bb75f3aa62" providerId="LiveId" clId="{DB2031DC-E114-489A-848D-700AE726DFF6}" dt="2022-11-13T21:13:28.136" v="124"/>
+          <ac:spMkLst>
+            <pc:docMk/>
+            <pc:sldMk cId="18036196" sldId="320"/>
+            <ac:spMk id="2" creationId="{EBE0E297-91EF-066D-47EF-BFE73830A7DB}"/>
+          </ac:spMkLst>
+        </pc:spChg>
+        <pc:spChg chg="del">
+          <ac:chgData name="Ziqing Yu" userId="76dbd0bb75f3aa62" providerId="LiveId" clId="{DB2031DC-E114-489A-848D-700AE726DFF6}" dt="2022-11-13T21:11:05.962" v="49"/>
+          <ac:spMkLst>
+            <pc:docMk/>
+            <pc:sldMk cId="18036196" sldId="320"/>
+            <ac:spMk id="3" creationId="{74E2D661-112F-08A4-B339-709217B076EF}"/>
+          </ac:spMkLst>
+        </pc:spChg>
+        <pc:picChg chg="add mod">
+          <ac:chgData name="Ziqing Yu" userId="76dbd0bb75f3aa62" providerId="LiveId" clId="{DB2031DC-E114-489A-848D-700AE726DFF6}" dt="2022-11-13T21:11:07.042" v="51" actId="962"/>
+          <ac:picMkLst>
+            <pc:docMk/>
+            <pc:sldMk cId="18036196" sldId="320"/>
+            <ac:picMk id="6" creationId="{D5FD4549-DD9A-03ED-B04B-553D9205D9E5}"/>
+          </ac:picMkLst>
+        </pc:picChg>
+      </pc:sldChg>
+      <pc:sldChg chg="addSp delSp modSp add mod">
+        <pc:chgData name="Ziqing Yu" userId="76dbd0bb75f3aa62" providerId="LiveId" clId="{DB2031DC-E114-489A-848D-700AE726DFF6}" dt="2022-11-13T21:13:33.784" v="127" actId="20577"/>
+        <pc:sldMkLst>
+          <pc:docMk/>
+          <pc:sldMk cId="94523218" sldId="321"/>
+        </pc:sldMkLst>
+        <pc:spChg chg="mod">
+          <ac:chgData name="Ziqing Yu" userId="76dbd0bb75f3aa62" providerId="LiveId" clId="{DB2031DC-E114-489A-848D-700AE726DFF6}" dt="2022-11-13T21:13:33.784" v="127" actId="20577"/>
+          <ac:spMkLst>
+            <pc:docMk/>
+            <pc:sldMk cId="94523218" sldId="321"/>
+            <ac:spMk id="2" creationId="{EBE0E297-91EF-066D-47EF-BFE73830A7DB}"/>
+          </ac:spMkLst>
+        </pc:spChg>
+        <pc:spChg chg="del">
+          <ac:chgData name="Ziqing Yu" userId="76dbd0bb75f3aa62" providerId="LiveId" clId="{DB2031DC-E114-489A-848D-700AE726DFF6}" dt="2022-11-13T21:11:25.754" v="52"/>
+          <ac:spMkLst>
+            <pc:docMk/>
+            <pc:sldMk cId="94523218" sldId="321"/>
+            <ac:spMk id="3" creationId="{74E2D661-112F-08A4-B339-709217B076EF}"/>
+          </ac:spMkLst>
+        </pc:spChg>
+        <pc:picChg chg="add mod">
+          <ac:chgData name="Ziqing Yu" userId="76dbd0bb75f3aa62" providerId="LiveId" clId="{DB2031DC-E114-489A-848D-700AE726DFF6}" dt="2022-11-13T21:11:25.754" v="52"/>
+          <ac:picMkLst>
+            <pc:docMk/>
+            <pc:sldMk cId="94523218" sldId="321"/>
+            <ac:picMk id="6" creationId="{9D32E5DE-CAEB-E0FF-5194-715999FFE013}"/>
+          </ac:picMkLst>
+        </pc:picChg>
+      </pc:sldChg>
+      <pc:sldChg chg="addSp delSp modSp add mod">
+        <pc:chgData name="Ziqing Yu" userId="76dbd0bb75f3aa62" providerId="LiveId" clId="{DB2031DC-E114-489A-848D-700AE726DFF6}" dt="2022-11-13T21:13:36.760" v="130" actId="20577"/>
+        <pc:sldMkLst>
+          <pc:docMk/>
+          <pc:sldMk cId="632559358" sldId="322"/>
+        </pc:sldMkLst>
+        <pc:spChg chg="mod">
+          <ac:chgData name="Ziqing Yu" userId="76dbd0bb75f3aa62" providerId="LiveId" clId="{DB2031DC-E114-489A-848D-700AE726DFF6}" dt="2022-11-13T21:13:36.760" v="130" actId="20577"/>
+          <ac:spMkLst>
+            <pc:docMk/>
+            <pc:sldMk cId="632559358" sldId="322"/>
+            <ac:spMk id="2" creationId="{EBE0E297-91EF-066D-47EF-BFE73830A7DB}"/>
+          </ac:spMkLst>
+        </pc:spChg>
+        <pc:spChg chg="del">
+          <ac:chgData name="Ziqing Yu" userId="76dbd0bb75f3aa62" providerId="LiveId" clId="{DB2031DC-E114-489A-848D-700AE726DFF6}" dt="2022-11-13T21:11:29.663" v="53"/>
+          <ac:spMkLst>
+            <pc:docMk/>
+            <pc:sldMk cId="632559358" sldId="322"/>
+            <ac:spMk id="3" creationId="{74E2D661-112F-08A4-B339-709217B076EF}"/>
+          </ac:spMkLst>
+        </pc:spChg>
+        <pc:picChg chg="add mod">
+          <ac:chgData name="Ziqing Yu" userId="76dbd0bb75f3aa62" providerId="LiveId" clId="{DB2031DC-E114-489A-848D-700AE726DFF6}" dt="2022-11-13T21:11:31.539" v="55" actId="962"/>
+          <ac:picMkLst>
+            <pc:docMk/>
+            <pc:sldMk cId="632559358" sldId="322"/>
+            <ac:picMk id="6" creationId="{ECD3FD61-A382-8299-A9B7-2B2CE0A984EE}"/>
+          </ac:picMkLst>
+        </pc:picChg>
+      </pc:sldChg>
+      <pc:sldChg chg="addSp delSp modSp add mod">
+        <pc:chgData name="Ziqing Yu" userId="76dbd0bb75f3aa62" providerId="LiveId" clId="{DB2031DC-E114-489A-848D-700AE726DFF6}" dt="2022-11-13T21:13:45.713" v="143" actId="20577"/>
+        <pc:sldMkLst>
+          <pc:docMk/>
+          <pc:sldMk cId="1641732916" sldId="323"/>
+        </pc:sldMkLst>
+        <pc:spChg chg="mod">
+          <ac:chgData name="Ziqing Yu" userId="76dbd0bb75f3aa62" providerId="LiveId" clId="{DB2031DC-E114-489A-848D-700AE726DFF6}" dt="2022-11-13T21:13:45.713" v="143" actId="20577"/>
+          <ac:spMkLst>
+            <pc:docMk/>
+            <pc:sldMk cId="1641732916" sldId="323"/>
+            <ac:spMk id="2" creationId="{EBE0E297-91EF-066D-47EF-BFE73830A7DB}"/>
+          </ac:spMkLst>
+        </pc:spChg>
+        <pc:spChg chg="del">
+          <ac:chgData name="Ziqing Yu" userId="76dbd0bb75f3aa62" providerId="LiveId" clId="{DB2031DC-E114-489A-848D-700AE726DFF6}" dt="2022-11-13T21:11:47.822" v="56"/>
+          <ac:spMkLst>
+            <pc:docMk/>
+            <pc:sldMk cId="1641732916" sldId="323"/>
+            <ac:spMk id="3" creationId="{74E2D661-112F-08A4-B339-709217B076EF}"/>
+          </ac:spMkLst>
+        </pc:spChg>
+        <pc:picChg chg="add mod">
+          <ac:chgData name="Ziqing Yu" userId="76dbd0bb75f3aa62" providerId="LiveId" clId="{DB2031DC-E114-489A-848D-700AE726DFF6}" dt="2022-11-13T21:11:48.423" v="58" actId="962"/>
+          <ac:picMkLst>
+            <pc:docMk/>
+            <pc:sldMk cId="1641732916" sldId="323"/>
+            <ac:picMk id="6" creationId="{900BF48F-C334-D058-D25C-1EB98D63A9CB}"/>
+          </ac:picMkLst>
+        </pc:picChg>
+      </pc:sldChg>
+      <pc:sldChg chg="addSp delSp modSp add mod">
+        <pc:chgData name="Ziqing Yu" userId="76dbd0bb75f3aa62" providerId="LiveId" clId="{DB2031DC-E114-489A-848D-700AE726DFF6}" dt="2022-11-13T21:13:50.430" v="144"/>
+        <pc:sldMkLst>
+          <pc:docMk/>
+          <pc:sldMk cId="3071097749" sldId="324"/>
+        </pc:sldMkLst>
+        <pc:spChg chg="mod">
+          <ac:chgData name="Ziqing Yu" userId="76dbd0bb75f3aa62" providerId="LiveId" clId="{DB2031DC-E114-489A-848D-700AE726DFF6}" dt="2022-11-13T21:13:50.430" v="144"/>
+          <ac:spMkLst>
+            <pc:docMk/>
+            <pc:sldMk cId="3071097749" sldId="324"/>
+            <ac:spMk id="2" creationId="{EBE0E297-91EF-066D-47EF-BFE73830A7DB}"/>
+          </ac:spMkLst>
+        </pc:spChg>
+        <pc:spChg chg="del">
+          <ac:chgData name="Ziqing Yu" userId="76dbd0bb75f3aa62" providerId="LiveId" clId="{DB2031DC-E114-489A-848D-700AE726DFF6}" dt="2022-11-13T21:11:58.618" v="59"/>
+          <ac:spMkLst>
+            <pc:docMk/>
+            <pc:sldMk cId="3071097749" sldId="324"/>
+            <ac:spMk id="3" creationId="{74E2D661-112F-08A4-B339-709217B076EF}"/>
+          </ac:spMkLst>
+        </pc:spChg>
+        <pc:picChg chg="add mod">
+          <ac:chgData name="Ziqing Yu" userId="76dbd0bb75f3aa62" providerId="LiveId" clId="{DB2031DC-E114-489A-848D-700AE726DFF6}" dt="2022-11-13T21:11:59.317" v="61" actId="962"/>
+          <ac:picMkLst>
+            <pc:docMk/>
+            <pc:sldMk cId="3071097749" sldId="324"/>
+            <ac:picMk id="6" creationId="{7EFAB785-4E69-32BA-C7FE-BD567F8151E5}"/>
+          </ac:picMkLst>
+        </pc:picChg>
+      </pc:sldChg>
+      <pc:sldChg chg="addSp delSp modSp add mod">
+        <pc:chgData name="Ziqing Yu" userId="76dbd0bb75f3aa62" providerId="LiveId" clId="{DB2031DC-E114-489A-848D-700AE726DFF6}" dt="2022-11-13T21:13:57.786" v="148" actId="20577"/>
+        <pc:sldMkLst>
+          <pc:docMk/>
+          <pc:sldMk cId="3618043062" sldId="325"/>
+        </pc:sldMkLst>
+        <pc:spChg chg="mod">
+          <ac:chgData name="Ziqing Yu" userId="76dbd0bb75f3aa62" providerId="LiveId" clId="{DB2031DC-E114-489A-848D-700AE726DFF6}" dt="2022-11-13T21:13:57.786" v="148" actId="20577"/>
+          <ac:spMkLst>
+            <pc:docMk/>
+            <pc:sldMk cId="3618043062" sldId="325"/>
+            <ac:spMk id="2" creationId="{EBE0E297-91EF-066D-47EF-BFE73830A7DB}"/>
+          </ac:spMkLst>
+        </pc:spChg>
+        <pc:spChg chg="del">
+          <ac:chgData name="Ziqing Yu" userId="76dbd0bb75f3aa62" providerId="LiveId" clId="{DB2031DC-E114-489A-848D-700AE726DFF6}" dt="2022-11-13T21:12:05.004" v="62"/>
+          <ac:spMkLst>
+            <pc:docMk/>
+            <pc:sldMk cId="3618043062" sldId="325"/>
+            <ac:spMk id="3" creationId="{74E2D661-112F-08A4-B339-709217B076EF}"/>
+          </ac:spMkLst>
+        </pc:spChg>
+        <pc:picChg chg="add mod">
+          <ac:chgData name="Ziqing Yu" userId="76dbd0bb75f3aa62" providerId="LiveId" clId="{DB2031DC-E114-489A-848D-700AE726DFF6}" dt="2022-11-13T21:12:06.985" v="63" actId="27614"/>
+          <ac:picMkLst>
+            <pc:docMk/>
+            <pc:sldMk cId="3618043062" sldId="325"/>
+            <ac:picMk id="6" creationId="{88847285-D886-62F1-2FD3-204114B938F9}"/>
+          </ac:picMkLst>
+        </pc:picChg>
+      </pc:sldChg>
+      <pc:sldChg chg="addSp delSp modSp add mod">
+        <pc:chgData name="Ziqing Yu" userId="76dbd0bb75f3aa62" providerId="LiveId" clId="{DB2031DC-E114-489A-848D-700AE726DFF6}" dt="2022-11-13T21:14:01.564" v="150" actId="20577"/>
+        <pc:sldMkLst>
+          <pc:docMk/>
+          <pc:sldMk cId="3110641159" sldId="326"/>
+        </pc:sldMkLst>
+        <pc:spChg chg="mod">
+          <ac:chgData name="Ziqing Yu" userId="76dbd0bb75f3aa62" providerId="LiveId" clId="{DB2031DC-E114-489A-848D-700AE726DFF6}" dt="2022-11-13T21:14:01.564" v="150" actId="20577"/>
+          <ac:spMkLst>
+            <pc:docMk/>
+            <pc:sldMk cId="3110641159" sldId="326"/>
+            <ac:spMk id="2" creationId="{EBE0E297-91EF-066D-47EF-BFE73830A7DB}"/>
+          </ac:spMkLst>
+        </pc:spChg>
+        <pc:spChg chg="del">
+          <ac:chgData name="Ziqing Yu" userId="76dbd0bb75f3aa62" providerId="LiveId" clId="{DB2031DC-E114-489A-848D-700AE726DFF6}" dt="2022-11-13T21:12:07.851" v="64"/>
+          <ac:spMkLst>
+            <pc:docMk/>
+            <pc:sldMk cId="3110641159" sldId="326"/>
+            <ac:spMk id="3" creationId="{74E2D661-112F-08A4-B339-709217B076EF}"/>
+          </ac:spMkLst>
+        </pc:spChg>
+        <pc:picChg chg="add mod">
+          <ac:chgData name="Ziqing Yu" userId="76dbd0bb75f3aa62" providerId="LiveId" clId="{DB2031DC-E114-489A-848D-700AE726DFF6}" dt="2022-11-13T21:12:08.658" v="65" actId="27614"/>
+          <ac:picMkLst>
+            <pc:docMk/>
+            <pc:sldMk cId="3110641159" sldId="326"/>
+            <ac:picMk id="6" creationId="{617E64C1-0A34-698B-86BD-06099522A303}"/>
+          </ac:picMkLst>
+        </pc:picChg>
+      </pc:sldChg>
+      <pc:sldChg chg="addSp delSp modSp add mod">
+        <pc:chgData name="Ziqing Yu" userId="76dbd0bb75f3aa62" providerId="LiveId" clId="{DB2031DC-E114-489A-848D-700AE726DFF6}" dt="2022-11-13T21:14:06.163" v="154" actId="20577"/>
+        <pc:sldMkLst>
+          <pc:docMk/>
+          <pc:sldMk cId="3499195192" sldId="327"/>
+        </pc:sldMkLst>
+        <pc:spChg chg="mod">
+          <ac:chgData name="Ziqing Yu" userId="76dbd0bb75f3aa62" providerId="LiveId" clId="{DB2031DC-E114-489A-848D-700AE726DFF6}" dt="2022-11-13T21:14:06.163" v="154" actId="20577"/>
+          <ac:spMkLst>
+            <pc:docMk/>
+            <pc:sldMk cId="3499195192" sldId="327"/>
+            <ac:spMk id="2" creationId="{EBE0E297-91EF-066D-47EF-BFE73830A7DB}"/>
+          </ac:spMkLst>
+        </pc:spChg>
+        <pc:spChg chg="del">
+          <ac:chgData name="Ziqing Yu" userId="76dbd0bb75f3aa62" providerId="LiveId" clId="{DB2031DC-E114-489A-848D-700AE726DFF6}" dt="2022-11-13T21:12:11.828" v="66"/>
+          <ac:spMkLst>
+            <pc:docMk/>
+            <pc:sldMk cId="3499195192" sldId="327"/>
+            <ac:spMk id="3" creationId="{74E2D661-112F-08A4-B339-709217B076EF}"/>
+          </ac:spMkLst>
+        </pc:spChg>
+        <pc:picChg chg="add mod">
+          <ac:chgData name="Ziqing Yu" userId="76dbd0bb75f3aa62" providerId="LiveId" clId="{DB2031DC-E114-489A-848D-700AE726DFF6}" dt="2022-11-13T21:12:12.600" v="67" actId="27614"/>
+          <ac:picMkLst>
+            <pc:docMk/>
+            <pc:sldMk cId="3499195192" sldId="327"/>
+            <ac:picMk id="6" creationId="{4B669771-1A8A-31F6-D623-A7FA00468A40}"/>
+          </ac:picMkLst>
+        </pc:picChg>
+      </pc:sldChg>
+      <pc:sldChg chg="addSp delSp modSp add mod">
+        <pc:chgData name="Ziqing Yu" userId="76dbd0bb75f3aa62" providerId="LiveId" clId="{DB2031DC-E114-489A-848D-700AE726DFF6}" dt="2022-11-13T21:14:09.597" v="157" actId="20577"/>
+        <pc:sldMkLst>
+          <pc:docMk/>
+          <pc:sldMk cId="3112462773" sldId="328"/>
+        </pc:sldMkLst>
+        <pc:spChg chg="mod">
+          <ac:chgData name="Ziqing Yu" userId="76dbd0bb75f3aa62" providerId="LiveId" clId="{DB2031DC-E114-489A-848D-700AE726DFF6}" dt="2022-11-13T21:14:09.597" v="157" actId="20577"/>
+          <ac:spMkLst>
+            <pc:docMk/>
+            <pc:sldMk cId="3112462773" sldId="328"/>
+            <ac:spMk id="2" creationId="{EBE0E297-91EF-066D-47EF-BFE73830A7DB}"/>
+          </ac:spMkLst>
+        </pc:spChg>
+        <pc:spChg chg="del">
+          <ac:chgData name="Ziqing Yu" userId="76dbd0bb75f3aa62" providerId="LiveId" clId="{DB2031DC-E114-489A-848D-700AE726DFF6}" dt="2022-11-13T21:12:16.019" v="68"/>
+          <ac:spMkLst>
+            <pc:docMk/>
+            <pc:sldMk cId="3112462773" sldId="328"/>
+            <ac:spMk id="3" creationId="{74E2D661-112F-08A4-B339-709217B076EF}"/>
+          </ac:spMkLst>
+        </pc:spChg>
+        <pc:picChg chg="add mod">
+          <ac:chgData name="Ziqing Yu" userId="76dbd0bb75f3aa62" providerId="LiveId" clId="{DB2031DC-E114-489A-848D-700AE726DFF6}" dt="2022-11-13T21:12:19.117" v="69" actId="27614"/>
+          <ac:picMkLst>
+            <pc:docMk/>
+            <pc:sldMk cId="3112462773" sldId="328"/>
+            <ac:picMk id="6" creationId="{359642C2-4801-BD2B-F21E-F2BBE30DF747}"/>
+          </ac:picMkLst>
+        </pc:picChg>
+      </pc:sldChg>
+      <pc:sldChg chg="addSp delSp modSp add">
+        <pc:chgData name="Ziqing Yu" userId="76dbd0bb75f3aa62" providerId="LiveId" clId="{DB2031DC-E114-489A-848D-700AE726DFF6}" dt="2022-11-13T21:12:26.274" v="70"/>
+        <pc:sldMkLst>
+          <pc:docMk/>
+          <pc:sldMk cId="1728119641" sldId="329"/>
+        </pc:sldMkLst>
+        <pc:spChg chg="del">
+          <ac:chgData name="Ziqing Yu" userId="76dbd0bb75f3aa62" providerId="LiveId" clId="{DB2031DC-E114-489A-848D-700AE726DFF6}" dt="2022-11-13T21:12:26.274" v="70"/>
+          <ac:spMkLst>
+            <pc:docMk/>
+            <pc:sldMk cId="1728119641" sldId="329"/>
+            <ac:spMk id="3" creationId="{74E2D661-112F-08A4-B339-709217B076EF}"/>
+          </ac:spMkLst>
+        </pc:spChg>
+        <pc:picChg chg="add mod">
+          <ac:chgData name="Ziqing Yu" userId="76dbd0bb75f3aa62" providerId="LiveId" clId="{DB2031DC-E114-489A-848D-700AE726DFF6}" dt="2022-11-13T21:12:26.274" v="70"/>
+          <ac:picMkLst>
+            <pc:docMk/>
+            <pc:sldMk cId="1728119641" sldId="329"/>
+            <ac:picMk id="6" creationId="{CA2FDC61-0C01-0E1D-6174-507BA6DA2095}"/>
+          </ac:picMkLst>
+        </pc:picChg>
+      </pc:sldChg>
+      <pc:sldChg chg="addSp delSp modSp add">
+        <pc:chgData name="Ziqing Yu" userId="76dbd0bb75f3aa62" providerId="LiveId" clId="{DB2031DC-E114-489A-848D-700AE726DFF6}" dt="2022-11-13T21:12:37.210" v="77" actId="962"/>
+        <pc:sldMkLst>
+          <pc:docMk/>
+          <pc:sldMk cId="2518948389" sldId="330"/>
+        </pc:sldMkLst>
+        <pc:spChg chg="del">
+          <ac:chgData name="Ziqing Yu" userId="76dbd0bb75f3aa62" providerId="LiveId" clId="{DB2031DC-E114-489A-848D-700AE726DFF6}" dt="2022-11-13T21:12:33.628" v="71"/>
+          <ac:spMkLst>
+            <pc:docMk/>
+            <pc:sldMk cId="2518948389" sldId="330"/>
+            <ac:spMk id="3" creationId="{74E2D661-112F-08A4-B339-709217B076EF}"/>
+          </ac:spMkLst>
+        </pc:spChg>
+        <pc:spChg chg="add del mod">
+          <ac:chgData name="Ziqing Yu" userId="76dbd0bb75f3aa62" providerId="LiveId" clId="{DB2031DC-E114-489A-848D-700AE726DFF6}" dt="2022-11-13T21:12:36.523" v="75"/>
+          <ac:spMkLst>
+            <pc:docMk/>
+            <pc:sldMk cId="2518948389" sldId="330"/>
+            <ac:spMk id="7" creationId="{62B00A76-0532-7927-68E3-FE4A02B1B620}"/>
+          </ac:spMkLst>
+        </pc:spChg>
+        <pc:picChg chg="add del mod">
+          <ac:chgData name="Ziqing Yu" userId="76dbd0bb75f3aa62" providerId="LiveId" clId="{DB2031DC-E114-489A-848D-700AE726DFF6}" dt="2022-11-13T21:12:35.299" v="74" actId="478"/>
+          <ac:picMkLst>
+            <pc:docMk/>
+            <pc:sldMk cId="2518948389" sldId="330"/>
+            <ac:picMk id="6" creationId="{78AB8D56-3ECC-7D87-600D-E23EC944FDAF}"/>
+          </ac:picMkLst>
+        </pc:picChg>
+        <pc:picChg chg="add mod">
+          <ac:chgData name="Ziqing Yu" userId="76dbd0bb75f3aa62" providerId="LiveId" clId="{DB2031DC-E114-489A-848D-700AE726DFF6}" dt="2022-11-13T21:12:37.210" v="77" actId="962"/>
+          <ac:picMkLst>
+            <pc:docMk/>
+            <pc:sldMk cId="2518948389" sldId="330"/>
+            <ac:picMk id="9" creationId="{CDDDF5DC-5D3D-0DD1-2F3B-CF5468E27642}"/>
+          </ac:picMkLst>
+        </pc:picChg>
+      </pc:sldChg>
+      <pc:sldChg chg="add del">
+        <pc:chgData name="Ziqing Yu" userId="76dbd0bb75f3aa62" providerId="LiveId" clId="{DB2031DC-E114-489A-848D-700AE726DFF6}" dt="2022-11-13T21:12:43.795" v="78" actId="47"/>
+        <pc:sldMkLst>
+          <pc:docMk/>
+          <pc:sldMk cId="1676771338" sldId="331"/>
+        </pc:sldMkLst>
+      </pc:sldChg>
+      <pc:sldChg chg="add del">
+        <pc:chgData name="Ziqing Yu" userId="76dbd0bb75f3aa62" providerId="LiveId" clId="{DB2031DC-E114-489A-848D-700AE726DFF6}" dt="2022-11-13T21:12:44.717" v="79" actId="47"/>
+        <pc:sldMkLst>
+          <pc:docMk/>
+          <pc:sldMk cId="4282321563" sldId="332"/>
+        </pc:sldMkLst>
+      </pc:sldChg>
+      <pc:sldChg chg="add del">
+        <pc:chgData name="Ziqing Yu" userId="76dbd0bb75f3aa62" providerId="LiveId" clId="{DB2031DC-E114-489A-848D-700AE726DFF6}" dt="2022-11-13T21:12:55.123" v="87" actId="47"/>
+        <pc:sldMkLst>
+          <pc:docMk/>
+          <pc:sldMk cId="3518704816" sldId="333"/>
+        </pc:sldMkLst>
+      </pc:sldChg>
+      <pc:sldChg chg="add del">
+        <pc:chgData name="Ziqing Yu" userId="76dbd0bb75f3aa62" providerId="LiveId" clId="{DB2031DC-E114-489A-848D-700AE726DFF6}" dt="2022-11-13T21:12:55.682" v="88" actId="47"/>
+        <pc:sldMkLst>
+          <pc:docMk/>
+          <pc:sldMk cId="2269333076" sldId="334"/>
+        </pc:sldMkLst>
+      </pc:sldChg>
+      <pc:sldChg chg="add del">
+        <pc:chgData name="Ziqing Yu" userId="76dbd0bb75f3aa62" providerId="LiveId" clId="{DB2031DC-E114-489A-848D-700AE726DFF6}" dt="2022-11-13T21:12:52.963" v="84" actId="47"/>
+        <pc:sldMkLst>
+          <pc:docMk/>
+          <pc:sldMk cId="53539009" sldId="335"/>
+        </pc:sldMkLst>
+      </pc:sldChg>
+      <pc:sldChg chg="add del">
+        <pc:chgData name="Ziqing Yu" userId="76dbd0bb75f3aa62" providerId="LiveId" clId="{DB2031DC-E114-489A-848D-700AE726DFF6}" dt="2022-11-13T21:12:53.482" v="85" actId="47"/>
+        <pc:sldMkLst>
+          <pc:docMk/>
+          <pc:sldMk cId="619021718" sldId="336"/>
+        </pc:sldMkLst>
+      </pc:sldChg>
+      <pc:sldChg chg="add del">
+        <pc:chgData name="Ziqing Yu" userId="76dbd0bb75f3aa62" providerId="LiveId" clId="{DB2031DC-E114-489A-848D-700AE726DFF6}" dt="2022-11-13T21:12:54.057" v="86" actId="47"/>
+        <pc:sldMkLst>
+          <pc:docMk/>
+          <pc:sldMk cId="3225041164" sldId="337"/>
+        </pc:sldMkLst>
+      </pc:sldChg>
+      <pc:sldChg chg="add del">
+        <pc:chgData name="Ziqing Yu" userId="76dbd0bb75f3aa62" providerId="LiveId" clId="{DB2031DC-E114-489A-848D-700AE726DFF6}" dt="2022-11-13T21:12:47.146" v="80" actId="47"/>
+        <pc:sldMkLst>
+          <pc:docMk/>
+          <pc:sldMk cId="242123116" sldId="338"/>
+        </pc:sldMkLst>
+      </pc:sldChg>
+      <pc:sldChg chg="add del">
+        <pc:chgData name="Ziqing Yu" userId="76dbd0bb75f3aa62" providerId="LiveId" clId="{DB2031DC-E114-489A-848D-700AE726DFF6}" dt="2022-11-13T21:12:47.584" v="81" actId="47"/>
+        <pc:sldMkLst>
+          <pc:docMk/>
+          <pc:sldMk cId="1947095485" sldId="339"/>
+        </pc:sldMkLst>
+      </pc:sldChg>
+    </pc:docChg>
+  </pc:docChgLst>
+</pc:chgInfo>
 </file>
 
 <file path=ppt/notesMasters/notesMaster1.xml><?xml version="1.0" encoding="utf-8"?>
@@ -5064,7 +5716,1031 @@
 </p:sld>
 </file>
 
-<file path=ppt/slides/slide2.xml><?xml version="1.0" encoding="utf-8"?>
+<file path=ppt/slides/slide10.xml><?xml version="1.0" encoding="utf-8"?>
+<p:sld xmlns:a="http://schemas.openxmlformats.org/drawingml/2006/main" xmlns:r="http://schemas.openxmlformats.org/officeDocument/2006/relationships" xmlns:p="http://schemas.openxmlformats.org/presentationml/2006/main">
+  <p:cSld>
+    <p:spTree>
+      <p:nvGrpSpPr>
+        <p:cNvPr id="1" name=""/>
+        <p:cNvGrpSpPr/>
+        <p:nvPr/>
+      </p:nvGrpSpPr>
+      <p:grpSpPr>
+        <a:xfrm>
+          <a:off x="0" y="0"/>
+          <a:ext cx="0" cy="0"/>
+          <a:chOff x="0" y="0"/>
+          <a:chExt cx="0" cy="0"/>
+        </a:xfrm>
+      </p:grpSpPr>
+      <p:sp>
+        <p:nvSpPr>
+          <p:cNvPr id="2" name="标题 1">
+            <a:extLst>
+              <a:ext uri="{FF2B5EF4-FFF2-40B4-BE49-F238E27FC236}">
+                <a16:creationId xmlns:a16="http://schemas.microsoft.com/office/drawing/2014/main" id="{EBE0E297-91EF-066D-47EF-BFE73830A7DB}"/>
+              </a:ext>
+            </a:extLst>
+          </p:cNvPr>
+          <p:cNvSpPr>
+            <a:spLocks noGrp="1"/>
+          </p:cNvSpPr>
+          <p:nvPr>
+            <p:ph type="title"/>
+          </p:nvPr>
+        </p:nvSpPr>
+        <p:spPr/>
+        <p:txBody>
+          <a:bodyPr/>
+          <a:lstStyle/>
+          <a:p>
+            <a:r>
+              <a:rPr lang="en-US" altLang="zh-CN" dirty="0"/>
+              <a:t>SWARM-A</a:t>
+            </a:r>
+            <a:endParaRPr lang="zh-CN" altLang="en-US" dirty="0"/>
+          </a:p>
+        </p:txBody>
+      </p:sp>
+      <p:pic>
+        <p:nvPicPr>
+          <p:cNvPr id="6" name="内容占位符 5" descr="图形用户界面, 文本, 应用程序&#10;&#10;描述已自动生成">
+            <a:extLst>
+              <a:ext uri="{FF2B5EF4-FFF2-40B4-BE49-F238E27FC236}">
+                <a16:creationId xmlns:a16="http://schemas.microsoft.com/office/drawing/2014/main" id="{900BF48F-C334-D058-D25C-1EB98D63A9CB}"/>
+              </a:ext>
+            </a:extLst>
+          </p:cNvPr>
+          <p:cNvPicPr>
+            <a:picLocks noGrp="1" noChangeAspect="1"/>
+          </p:cNvPicPr>
+          <p:nvPr>
+            <p:ph idx="1"/>
+          </p:nvPr>
+        </p:nvPicPr>
+        <p:blipFill>
+          <a:blip r:embed="rId2">
+            <a:extLst>
+              <a:ext uri="{28A0092B-C50C-407E-A947-70E740481C1C}">
+                <a14:useLocalDpi xmlns:a14="http://schemas.microsoft.com/office/drawing/2010/main" val="0"/>
+              </a:ext>
+            </a:extLst>
+          </a:blip>
+          <a:stretch>
+            <a:fillRect/>
+          </a:stretch>
+        </p:blipFill>
+        <p:spPr>
+          <a:xfrm>
+            <a:off x="685800" y="1530314"/>
+            <a:ext cx="7772400" cy="4025972"/>
+          </a:xfrm>
+        </p:spPr>
+      </p:pic>
+      <p:sp>
+        <p:nvSpPr>
+          <p:cNvPr id="4" name="灯片编号占位符 3">
+            <a:extLst>
+              <a:ext uri="{FF2B5EF4-FFF2-40B4-BE49-F238E27FC236}">
+                <a16:creationId xmlns:a16="http://schemas.microsoft.com/office/drawing/2014/main" id="{2262029F-AC96-72A3-5A4C-61C3D87E0C75}"/>
+              </a:ext>
+            </a:extLst>
+          </p:cNvPr>
+          <p:cNvSpPr>
+            <a:spLocks noGrp="1"/>
+          </p:cNvSpPr>
+          <p:nvPr>
+            <p:ph type="sldNum" sz="quarter" idx="12"/>
+          </p:nvPr>
+        </p:nvSpPr>
+        <p:spPr/>
+        <p:txBody>
+          <a:bodyPr/>
+          <a:lstStyle/>
+          <a:p>
+            <a:pPr>
+              <a:defRPr/>
+            </a:pPr>
+            <a:fld id="{A26A0649-E50C-4844-BD05-C05B747519B9}" type="slidenum">
+              <a:rPr lang="de-DE" altLang="en-US" smtClean="0"/>
+              <a:pPr>
+                <a:defRPr/>
+              </a:pPr>
+              <a:t>10</a:t>
+            </a:fld>
+            <a:endParaRPr lang="de-DE" altLang="en-US"/>
+          </a:p>
+        </p:txBody>
+      </p:sp>
+    </p:spTree>
+    <p:extLst>
+      <p:ext uri="{BB962C8B-B14F-4D97-AF65-F5344CB8AC3E}">
+        <p14:creationId xmlns:p14="http://schemas.microsoft.com/office/powerpoint/2010/main" val="1641732916"/>
+      </p:ext>
+    </p:extLst>
+  </p:cSld>
+  <p:clrMapOvr>
+    <a:masterClrMapping/>
+  </p:clrMapOvr>
+</p:sld>
+</file>
+
+<file path=ppt/slides/slide11.xml><?xml version="1.0" encoding="utf-8"?>
+<p:sld xmlns:a="http://schemas.openxmlformats.org/drawingml/2006/main" xmlns:r="http://schemas.openxmlformats.org/officeDocument/2006/relationships" xmlns:p="http://schemas.openxmlformats.org/presentationml/2006/main">
+  <p:cSld>
+    <p:spTree>
+      <p:nvGrpSpPr>
+        <p:cNvPr id="1" name=""/>
+        <p:cNvGrpSpPr/>
+        <p:nvPr/>
+      </p:nvGrpSpPr>
+      <p:grpSpPr>
+        <a:xfrm>
+          <a:off x="0" y="0"/>
+          <a:ext cx="0" cy="0"/>
+          <a:chOff x="0" y="0"/>
+          <a:chExt cx="0" cy="0"/>
+        </a:xfrm>
+      </p:grpSpPr>
+      <p:sp>
+        <p:nvSpPr>
+          <p:cNvPr id="2" name="标题 1">
+            <a:extLst>
+              <a:ext uri="{FF2B5EF4-FFF2-40B4-BE49-F238E27FC236}">
+                <a16:creationId xmlns:a16="http://schemas.microsoft.com/office/drawing/2014/main" id="{EBE0E297-91EF-066D-47EF-BFE73830A7DB}"/>
+              </a:ext>
+            </a:extLst>
+          </p:cNvPr>
+          <p:cNvSpPr>
+            <a:spLocks noGrp="1"/>
+          </p:cNvSpPr>
+          <p:nvPr>
+            <p:ph type="title"/>
+          </p:nvPr>
+        </p:nvSpPr>
+        <p:spPr/>
+        <p:txBody>
+          <a:bodyPr/>
+          <a:lstStyle/>
+          <a:p>
+            <a:r>
+              <a:rPr lang="en-US" altLang="zh-CN" dirty="0"/>
+              <a:t>SWARM-A</a:t>
+            </a:r>
+            <a:endParaRPr lang="zh-CN" altLang="en-US" dirty="0"/>
+          </a:p>
+        </p:txBody>
+      </p:sp>
+      <p:pic>
+        <p:nvPicPr>
+          <p:cNvPr id="6" name="内容占位符 5" descr="图表, 散点图&#10;&#10;描述已自动生成">
+            <a:extLst>
+              <a:ext uri="{FF2B5EF4-FFF2-40B4-BE49-F238E27FC236}">
+                <a16:creationId xmlns:a16="http://schemas.microsoft.com/office/drawing/2014/main" id="{7EFAB785-4E69-32BA-C7FE-BD567F8151E5}"/>
+              </a:ext>
+            </a:extLst>
+          </p:cNvPr>
+          <p:cNvPicPr>
+            <a:picLocks noGrp="1" noChangeAspect="1"/>
+          </p:cNvPicPr>
+          <p:nvPr>
+            <p:ph idx="1"/>
+          </p:nvPr>
+        </p:nvPicPr>
+        <p:blipFill>
+          <a:blip r:embed="rId2">
+            <a:extLst>
+              <a:ext uri="{28A0092B-C50C-407E-A947-70E740481C1C}">
+                <a14:useLocalDpi xmlns:a14="http://schemas.microsoft.com/office/drawing/2010/main" val="0"/>
+              </a:ext>
+            </a:extLst>
+          </a:blip>
+          <a:stretch>
+            <a:fillRect/>
+          </a:stretch>
+        </p:blipFill>
+        <p:spPr>
+          <a:xfrm>
+            <a:off x="685800" y="1530314"/>
+            <a:ext cx="7772400" cy="4025972"/>
+          </a:xfrm>
+        </p:spPr>
+      </p:pic>
+      <p:sp>
+        <p:nvSpPr>
+          <p:cNvPr id="4" name="灯片编号占位符 3">
+            <a:extLst>
+              <a:ext uri="{FF2B5EF4-FFF2-40B4-BE49-F238E27FC236}">
+                <a16:creationId xmlns:a16="http://schemas.microsoft.com/office/drawing/2014/main" id="{2262029F-AC96-72A3-5A4C-61C3D87E0C75}"/>
+              </a:ext>
+            </a:extLst>
+          </p:cNvPr>
+          <p:cNvSpPr>
+            <a:spLocks noGrp="1"/>
+          </p:cNvSpPr>
+          <p:nvPr>
+            <p:ph type="sldNum" sz="quarter" idx="12"/>
+          </p:nvPr>
+        </p:nvSpPr>
+        <p:spPr/>
+        <p:txBody>
+          <a:bodyPr/>
+          <a:lstStyle/>
+          <a:p>
+            <a:pPr>
+              <a:defRPr/>
+            </a:pPr>
+            <a:fld id="{A26A0649-E50C-4844-BD05-C05B747519B9}" type="slidenum">
+              <a:rPr lang="de-DE" altLang="en-US" smtClean="0"/>
+              <a:pPr>
+                <a:defRPr/>
+              </a:pPr>
+              <a:t>11</a:t>
+            </a:fld>
+            <a:endParaRPr lang="de-DE" altLang="en-US"/>
+          </a:p>
+        </p:txBody>
+      </p:sp>
+    </p:spTree>
+    <p:extLst>
+      <p:ext uri="{BB962C8B-B14F-4D97-AF65-F5344CB8AC3E}">
+        <p14:creationId xmlns:p14="http://schemas.microsoft.com/office/powerpoint/2010/main" val="3071097749"/>
+      </p:ext>
+    </p:extLst>
+  </p:cSld>
+  <p:clrMapOvr>
+    <a:masterClrMapping/>
+  </p:clrMapOvr>
+</p:sld>
+</file>
+
+<file path=ppt/slides/slide12.xml><?xml version="1.0" encoding="utf-8"?>
+<p:sld xmlns:a="http://schemas.openxmlformats.org/drawingml/2006/main" xmlns:r="http://schemas.openxmlformats.org/officeDocument/2006/relationships" xmlns:p="http://schemas.openxmlformats.org/presentationml/2006/main">
+  <p:cSld>
+    <p:spTree>
+      <p:nvGrpSpPr>
+        <p:cNvPr id="1" name=""/>
+        <p:cNvGrpSpPr/>
+        <p:nvPr/>
+      </p:nvGrpSpPr>
+      <p:grpSpPr>
+        <a:xfrm>
+          <a:off x="0" y="0"/>
+          <a:ext cx="0" cy="0"/>
+          <a:chOff x="0" y="0"/>
+          <a:chExt cx="0" cy="0"/>
+        </a:xfrm>
+      </p:grpSpPr>
+      <p:sp>
+        <p:nvSpPr>
+          <p:cNvPr id="2" name="标题 1">
+            <a:extLst>
+              <a:ext uri="{FF2B5EF4-FFF2-40B4-BE49-F238E27FC236}">
+                <a16:creationId xmlns:a16="http://schemas.microsoft.com/office/drawing/2014/main" id="{EBE0E297-91EF-066D-47EF-BFE73830A7DB}"/>
+              </a:ext>
+            </a:extLst>
+          </p:cNvPr>
+          <p:cNvSpPr>
+            <a:spLocks noGrp="1"/>
+          </p:cNvSpPr>
+          <p:nvPr>
+            <p:ph type="title"/>
+          </p:nvPr>
+        </p:nvSpPr>
+        <p:spPr/>
+        <p:txBody>
+          <a:bodyPr/>
+          <a:lstStyle/>
+          <a:p>
+            <a:r>
+              <a:rPr lang="en-US" altLang="zh-CN" dirty="0"/>
+              <a:t>SWARM-B</a:t>
+            </a:r>
+            <a:endParaRPr lang="zh-CN" altLang="en-US" dirty="0"/>
+          </a:p>
+        </p:txBody>
+      </p:sp>
+      <p:pic>
+        <p:nvPicPr>
+          <p:cNvPr id="6" name="内容占位符 5" descr="图形用户界面, 应用程序&#10;&#10;中度可信度描述已自动生成">
+            <a:extLst>
+              <a:ext uri="{FF2B5EF4-FFF2-40B4-BE49-F238E27FC236}">
+                <a16:creationId xmlns:a16="http://schemas.microsoft.com/office/drawing/2014/main" id="{88847285-D886-62F1-2FD3-204114B938F9}"/>
+              </a:ext>
+            </a:extLst>
+          </p:cNvPr>
+          <p:cNvPicPr>
+            <a:picLocks noGrp="1" noChangeAspect="1"/>
+          </p:cNvPicPr>
+          <p:nvPr>
+            <p:ph idx="1"/>
+          </p:nvPr>
+        </p:nvPicPr>
+        <p:blipFill>
+          <a:blip r:embed="rId2">
+            <a:extLst>
+              <a:ext uri="{28A0092B-C50C-407E-A947-70E740481C1C}">
+                <a14:useLocalDpi xmlns:a14="http://schemas.microsoft.com/office/drawing/2010/main" val="0"/>
+              </a:ext>
+            </a:extLst>
+          </a:blip>
+          <a:stretch>
+            <a:fillRect/>
+          </a:stretch>
+        </p:blipFill>
+        <p:spPr>
+          <a:xfrm>
+            <a:off x="685800" y="1530804"/>
+            <a:ext cx="7772400" cy="4024992"/>
+          </a:xfrm>
+        </p:spPr>
+      </p:pic>
+      <p:sp>
+        <p:nvSpPr>
+          <p:cNvPr id="4" name="灯片编号占位符 3">
+            <a:extLst>
+              <a:ext uri="{FF2B5EF4-FFF2-40B4-BE49-F238E27FC236}">
+                <a16:creationId xmlns:a16="http://schemas.microsoft.com/office/drawing/2014/main" id="{2262029F-AC96-72A3-5A4C-61C3D87E0C75}"/>
+              </a:ext>
+            </a:extLst>
+          </p:cNvPr>
+          <p:cNvSpPr>
+            <a:spLocks noGrp="1"/>
+          </p:cNvSpPr>
+          <p:nvPr>
+            <p:ph type="sldNum" sz="quarter" idx="12"/>
+          </p:nvPr>
+        </p:nvSpPr>
+        <p:spPr/>
+        <p:txBody>
+          <a:bodyPr/>
+          <a:lstStyle/>
+          <a:p>
+            <a:pPr>
+              <a:defRPr/>
+            </a:pPr>
+            <a:fld id="{A26A0649-E50C-4844-BD05-C05B747519B9}" type="slidenum">
+              <a:rPr lang="de-DE" altLang="en-US" smtClean="0"/>
+              <a:pPr>
+                <a:defRPr/>
+              </a:pPr>
+              <a:t>12</a:t>
+            </a:fld>
+            <a:endParaRPr lang="de-DE" altLang="en-US"/>
+          </a:p>
+        </p:txBody>
+      </p:sp>
+    </p:spTree>
+    <p:extLst>
+      <p:ext uri="{BB962C8B-B14F-4D97-AF65-F5344CB8AC3E}">
+        <p14:creationId xmlns:p14="http://schemas.microsoft.com/office/powerpoint/2010/main" val="3618043062"/>
+      </p:ext>
+    </p:extLst>
+  </p:cSld>
+  <p:clrMapOvr>
+    <a:masterClrMapping/>
+  </p:clrMapOvr>
+</p:sld>
+</file>
+
+<file path=ppt/slides/slide13.xml><?xml version="1.0" encoding="utf-8"?>
+<p:sld xmlns:a="http://schemas.openxmlformats.org/drawingml/2006/main" xmlns:r="http://schemas.openxmlformats.org/officeDocument/2006/relationships" xmlns:p="http://schemas.openxmlformats.org/presentationml/2006/main">
+  <p:cSld>
+    <p:spTree>
+      <p:nvGrpSpPr>
+        <p:cNvPr id="1" name=""/>
+        <p:cNvGrpSpPr/>
+        <p:nvPr/>
+      </p:nvGrpSpPr>
+      <p:grpSpPr>
+        <a:xfrm>
+          <a:off x="0" y="0"/>
+          <a:ext cx="0" cy="0"/>
+          <a:chOff x="0" y="0"/>
+          <a:chExt cx="0" cy="0"/>
+        </a:xfrm>
+      </p:grpSpPr>
+      <p:sp>
+        <p:nvSpPr>
+          <p:cNvPr id="2" name="标题 1">
+            <a:extLst>
+              <a:ext uri="{FF2B5EF4-FFF2-40B4-BE49-F238E27FC236}">
+                <a16:creationId xmlns:a16="http://schemas.microsoft.com/office/drawing/2014/main" id="{EBE0E297-91EF-066D-47EF-BFE73830A7DB}"/>
+              </a:ext>
+            </a:extLst>
+          </p:cNvPr>
+          <p:cNvSpPr>
+            <a:spLocks noGrp="1"/>
+          </p:cNvSpPr>
+          <p:nvPr>
+            <p:ph type="title"/>
+          </p:nvPr>
+        </p:nvSpPr>
+        <p:spPr/>
+        <p:txBody>
+          <a:bodyPr/>
+          <a:lstStyle/>
+          <a:p>
+            <a:r>
+              <a:rPr lang="en-US" altLang="zh-CN" dirty="0"/>
+              <a:t>SWARM-B</a:t>
+            </a:r>
+            <a:endParaRPr lang="zh-CN" altLang="en-US" dirty="0"/>
+          </a:p>
+        </p:txBody>
+      </p:sp>
+      <p:pic>
+        <p:nvPicPr>
+          <p:cNvPr id="6" name="内容占位符 5" descr="图表, 散点图&#10;&#10;描述已自动生成">
+            <a:extLst>
+              <a:ext uri="{FF2B5EF4-FFF2-40B4-BE49-F238E27FC236}">
+                <a16:creationId xmlns:a16="http://schemas.microsoft.com/office/drawing/2014/main" id="{617E64C1-0A34-698B-86BD-06099522A303}"/>
+              </a:ext>
+            </a:extLst>
+          </p:cNvPr>
+          <p:cNvPicPr>
+            <a:picLocks noGrp="1" noChangeAspect="1"/>
+          </p:cNvPicPr>
+          <p:nvPr>
+            <p:ph idx="1"/>
+          </p:nvPr>
+        </p:nvPicPr>
+        <p:blipFill>
+          <a:blip r:embed="rId2">
+            <a:extLst>
+              <a:ext uri="{28A0092B-C50C-407E-A947-70E740481C1C}">
+                <a14:useLocalDpi xmlns:a14="http://schemas.microsoft.com/office/drawing/2010/main" val="0"/>
+              </a:ext>
+            </a:extLst>
+          </a:blip>
+          <a:stretch>
+            <a:fillRect/>
+          </a:stretch>
+        </p:blipFill>
+        <p:spPr>
+          <a:xfrm>
+            <a:off x="685800" y="1530314"/>
+            <a:ext cx="7772400" cy="4025972"/>
+          </a:xfrm>
+        </p:spPr>
+      </p:pic>
+      <p:sp>
+        <p:nvSpPr>
+          <p:cNvPr id="4" name="灯片编号占位符 3">
+            <a:extLst>
+              <a:ext uri="{FF2B5EF4-FFF2-40B4-BE49-F238E27FC236}">
+                <a16:creationId xmlns:a16="http://schemas.microsoft.com/office/drawing/2014/main" id="{2262029F-AC96-72A3-5A4C-61C3D87E0C75}"/>
+              </a:ext>
+            </a:extLst>
+          </p:cNvPr>
+          <p:cNvSpPr>
+            <a:spLocks noGrp="1"/>
+          </p:cNvSpPr>
+          <p:nvPr>
+            <p:ph type="sldNum" sz="quarter" idx="12"/>
+          </p:nvPr>
+        </p:nvSpPr>
+        <p:spPr/>
+        <p:txBody>
+          <a:bodyPr/>
+          <a:lstStyle/>
+          <a:p>
+            <a:pPr>
+              <a:defRPr/>
+            </a:pPr>
+            <a:fld id="{A26A0649-E50C-4844-BD05-C05B747519B9}" type="slidenum">
+              <a:rPr lang="de-DE" altLang="en-US" smtClean="0"/>
+              <a:pPr>
+                <a:defRPr/>
+              </a:pPr>
+              <a:t>13</a:t>
+            </a:fld>
+            <a:endParaRPr lang="de-DE" altLang="en-US"/>
+          </a:p>
+        </p:txBody>
+      </p:sp>
+    </p:spTree>
+    <p:extLst>
+      <p:ext uri="{BB962C8B-B14F-4D97-AF65-F5344CB8AC3E}">
+        <p14:creationId xmlns:p14="http://schemas.microsoft.com/office/powerpoint/2010/main" val="3110641159"/>
+      </p:ext>
+    </p:extLst>
+  </p:cSld>
+  <p:clrMapOvr>
+    <a:masterClrMapping/>
+  </p:clrMapOvr>
+</p:sld>
+</file>
+
+<file path=ppt/slides/slide14.xml><?xml version="1.0" encoding="utf-8"?>
+<p:sld xmlns:a="http://schemas.openxmlformats.org/drawingml/2006/main" xmlns:r="http://schemas.openxmlformats.org/officeDocument/2006/relationships" xmlns:p="http://schemas.openxmlformats.org/presentationml/2006/main">
+  <p:cSld>
+    <p:spTree>
+      <p:nvGrpSpPr>
+        <p:cNvPr id="1" name=""/>
+        <p:cNvGrpSpPr/>
+        <p:nvPr/>
+      </p:nvGrpSpPr>
+      <p:grpSpPr>
+        <a:xfrm>
+          <a:off x="0" y="0"/>
+          <a:ext cx="0" cy="0"/>
+          <a:chOff x="0" y="0"/>
+          <a:chExt cx="0" cy="0"/>
+        </a:xfrm>
+      </p:grpSpPr>
+      <p:sp>
+        <p:nvSpPr>
+          <p:cNvPr id="2" name="标题 1">
+            <a:extLst>
+              <a:ext uri="{FF2B5EF4-FFF2-40B4-BE49-F238E27FC236}">
+                <a16:creationId xmlns:a16="http://schemas.microsoft.com/office/drawing/2014/main" id="{EBE0E297-91EF-066D-47EF-BFE73830A7DB}"/>
+              </a:ext>
+            </a:extLst>
+          </p:cNvPr>
+          <p:cNvSpPr>
+            <a:spLocks noGrp="1"/>
+          </p:cNvSpPr>
+          <p:nvPr>
+            <p:ph type="title"/>
+          </p:nvPr>
+        </p:nvSpPr>
+        <p:spPr/>
+        <p:txBody>
+          <a:bodyPr/>
+          <a:lstStyle/>
+          <a:p>
+            <a:r>
+              <a:rPr lang="en-US" altLang="zh-CN" dirty="0"/>
+              <a:t>SWARM-C</a:t>
+            </a:r>
+            <a:endParaRPr lang="zh-CN" altLang="en-US" b="1" dirty="0"/>
+          </a:p>
+        </p:txBody>
+      </p:sp>
+      <p:pic>
+        <p:nvPicPr>
+          <p:cNvPr id="6" name="内容占位符 5" descr="文本&#10;&#10;中度可信度描述已自动生成">
+            <a:extLst>
+              <a:ext uri="{FF2B5EF4-FFF2-40B4-BE49-F238E27FC236}">
+                <a16:creationId xmlns:a16="http://schemas.microsoft.com/office/drawing/2014/main" id="{4B669771-1A8A-31F6-D623-A7FA00468A40}"/>
+              </a:ext>
+            </a:extLst>
+          </p:cNvPr>
+          <p:cNvPicPr>
+            <a:picLocks noGrp="1" noChangeAspect="1"/>
+          </p:cNvPicPr>
+          <p:nvPr>
+            <p:ph idx="1"/>
+          </p:nvPr>
+        </p:nvPicPr>
+        <p:blipFill>
+          <a:blip r:embed="rId2">
+            <a:extLst>
+              <a:ext uri="{28A0092B-C50C-407E-A947-70E740481C1C}">
+                <a14:useLocalDpi xmlns:a14="http://schemas.microsoft.com/office/drawing/2010/main" val="0"/>
+              </a:ext>
+            </a:extLst>
+          </a:blip>
+          <a:stretch>
+            <a:fillRect/>
+          </a:stretch>
+        </p:blipFill>
+        <p:spPr>
+          <a:xfrm>
+            <a:off x="685800" y="1530314"/>
+            <a:ext cx="7772400" cy="4025972"/>
+          </a:xfrm>
+        </p:spPr>
+      </p:pic>
+      <p:sp>
+        <p:nvSpPr>
+          <p:cNvPr id="4" name="灯片编号占位符 3">
+            <a:extLst>
+              <a:ext uri="{FF2B5EF4-FFF2-40B4-BE49-F238E27FC236}">
+                <a16:creationId xmlns:a16="http://schemas.microsoft.com/office/drawing/2014/main" id="{2262029F-AC96-72A3-5A4C-61C3D87E0C75}"/>
+              </a:ext>
+            </a:extLst>
+          </p:cNvPr>
+          <p:cNvSpPr>
+            <a:spLocks noGrp="1"/>
+          </p:cNvSpPr>
+          <p:nvPr>
+            <p:ph type="sldNum" sz="quarter" idx="12"/>
+          </p:nvPr>
+        </p:nvSpPr>
+        <p:spPr/>
+        <p:txBody>
+          <a:bodyPr/>
+          <a:lstStyle/>
+          <a:p>
+            <a:pPr>
+              <a:defRPr/>
+            </a:pPr>
+            <a:fld id="{A26A0649-E50C-4844-BD05-C05B747519B9}" type="slidenum">
+              <a:rPr lang="de-DE" altLang="en-US" smtClean="0"/>
+              <a:pPr>
+                <a:defRPr/>
+              </a:pPr>
+              <a:t>14</a:t>
+            </a:fld>
+            <a:endParaRPr lang="de-DE" altLang="en-US"/>
+          </a:p>
+        </p:txBody>
+      </p:sp>
+    </p:spTree>
+    <p:extLst>
+      <p:ext uri="{BB962C8B-B14F-4D97-AF65-F5344CB8AC3E}">
+        <p14:creationId xmlns:p14="http://schemas.microsoft.com/office/powerpoint/2010/main" val="3499195192"/>
+      </p:ext>
+    </p:extLst>
+  </p:cSld>
+  <p:clrMapOvr>
+    <a:masterClrMapping/>
+  </p:clrMapOvr>
+</p:sld>
+</file>
+
+<file path=ppt/slides/slide15.xml><?xml version="1.0" encoding="utf-8"?>
+<p:sld xmlns:a="http://schemas.openxmlformats.org/drawingml/2006/main" xmlns:r="http://schemas.openxmlformats.org/officeDocument/2006/relationships" xmlns:p="http://schemas.openxmlformats.org/presentationml/2006/main">
+  <p:cSld>
+    <p:spTree>
+      <p:nvGrpSpPr>
+        <p:cNvPr id="1" name=""/>
+        <p:cNvGrpSpPr/>
+        <p:nvPr/>
+      </p:nvGrpSpPr>
+      <p:grpSpPr>
+        <a:xfrm>
+          <a:off x="0" y="0"/>
+          <a:ext cx="0" cy="0"/>
+          <a:chOff x="0" y="0"/>
+          <a:chExt cx="0" cy="0"/>
+        </a:xfrm>
+      </p:grpSpPr>
+      <p:sp>
+        <p:nvSpPr>
+          <p:cNvPr id="2" name="标题 1">
+            <a:extLst>
+              <a:ext uri="{FF2B5EF4-FFF2-40B4-BE49-F238E27FC236}">
+                <a16:creationId xmlns:a16="http://schemas.microsoft.com/office/drawing/2014/main" id="{EBE0E297-91EF-066D-47EF-BFE73830A7DB}"/>
+              </a:ext>
+            </a:extLst>
+          </p:cNvPr>
+          <p:cNvSpPr>
+            <a:spLocks noGrp="1"/>
+          </p:cNvSpPr>
+          <p:nvPr>
+            <p:ph type="title"/>
+          </p:nvPr>
+        </p:nvSpPr>
+        <p:spPr/>
+        <p:txBody>
+          <a:bodyPr/>
+          <a:lstStyle/>
+          <a:p>
+            <a:r>
+              <a:rPr lang="en-US" altLang="zh-CN"/>
+              <a:t>SWARM-C</a:t>
+            </a:r>
+            <a:endParaRPr lang="zh-CN" altLang="en-US"/>
+          </a:p>
+        </p:txBody>
+      </p:sp>
+      <p:pic>
+        <p:nvPicPr>
+          <p:cNvPr id="6" name="内容占位符 5" descr="图表, 散点图&#10;&#10;描述已自动生成">
+            <a:extLst>
+              <a:ext uri="{FF2B5EF4-FFF2-40B4-BE49-F238E27FC236}">
+                <a16:creationId xmlns:a16="http://schemas.microsoft.com/office/drawing/2014/main" id="{359642C2-4801-BD2B-F21E-F2BBE30DF747}"/>
+              </a:ext>
+            </a:extLst>
+          </p:cNvPr>
+          <p:cNvPicPr>
+            <a:picLocks noGrp="1" noChangeAspect="1"/>
+          </p:cNvPicPr>
+          <p:nvPr>
+            <p:ph idx="1"/>
+          </p:nvPr>
+        </p:nvPicPr>
+        <p:blipFill>
+          <a:blip r:embed="rId2">
+            <a:extLst>
+              <a:ext uri="{28A0092B-C50C-407E-A947-70E740481C1C}">
+                <a14:useLocalDpi xmlns:a14="http://schemas.microsoft.com/office/drawing/2010/main" val="0"/>
+              </a:ext>
+            </a:extLst>
+          </a:blip>
+          <a:stretch>
+            <a:fillRect/>
+          </a:stretch>
+        </p:blipFill>
+        <p:spPr>
+          <a:xfrm>
+            <a:off x="685800" y="1530314"/>
+            <a:ext cx="7772400" cy="4025972"/>
+          </a:xfrm>
+        </p:spPr>
+      </p:pic>
+      <p:sp>
+        <p:nvSpPr>
+          <p:cNvPr id="4" name="灯片编号占位符 3">
+            <a:extLst>
+              <a:ext uri="{FF2B5EF4-FFF2-40B4-BE49-F238E27FC236}">
+                <a16:creationId xmlns:a16="http://schemas.microsoft.com/office/drawing/2014/main" id="{2262029F-AC96-72A3-5A4C-61C3D87E0C75}"/>
+              </a:ext>
+            </a:extLst>
+          </p:cNvPr>
+          <p:cNvSpPr>
+            <a:spLocks noGrp="1"/>
+          </p:cNvSpPr>
+          <p:nvPr>
+            <p:ph type="sldNum" sz="quarter" idx="12"/>
+          </p:nvPr>
+        </p:nvSpPr>
+        <p:spPr/>
+        <p:txBody>
+          <a:bodyPr/>
+          <a:lstStyle/>
+          <a:p>
+            <a:pPr>
+              <a:defRPr/>
+            </a:pPr>
+            <a:fld id="{A26A0649-E50C-4844-BD05-C05B747519B9}" type="slidenum">
+              <a:rPr lang="de-DE" altLang="en-US" smtClean="0"/>
+              <a:pPr>
+                <a:defRPr/>
+              </a:pPr>
+              <a:t>15</a:t>
+            </a:fld>
+            <a:endParaRPr lang="de-DE" altLang="en-US"/>
+          </a:p>
+        </p:txBody>
+      </p:sp>
+    </p:spTree>
+    <p:extLst>
+      <p:ext uri="{BB962C8B-B14F-4D97-AF65-F5344CB8AC3E}">
+        <p14:creationId xmlns:p14="http://schemas.microsoft.com/office/powerpoint/2010/main" val="3112462773"/>
+      </p:ext>
+    </p:extLst>
+  </p:cSld>
+  <p:clrMapOvr>
+    <a:masterClrMapping/>
+  </p:clrMapOvr>
+</p:sld>
+</file>
+
+<file path=ppt/slides/slide16.xml><?xml version="1.0" encoding="utf-8"?>
+<p:sld xmlns:a="http://schemas.openxmlformats.org/drawingml/2006/main" xmlns:r="http://schemas.openxmlformats.org/officeDocument/2006/relationships" xmlns:p="http://schemas.openxmlformats.org/presentationml/2006/main">
+  <p:cSld>
+    <p:spTree>
+      <p:nvGrpSpPr>
+        <p:cNvPr id="1" name=""/>
+        <p:cNvGrpSpPr/>
+        <p:nvPr/>
+      </p:nvGrpSpPr>
+      <p:grpSpPr>
+        <a:xfrm>
+          <a:off x="0" y="0"/>
+          <a:ext cx="0" cy="0"/>
+          <a:chOff x="0" y="0"/>
+          <a:chExt cx="0" cy="0"/>
+        </a:xfrm>
+      </p:grpSpPr>
+      <p:sp>
+        <p:nvSpPr>
+          <p:cNvPr id="2" name="标题 1">
+            <a:extLst>
+              <a:ext uri="{FF2B5EF4-FFF2-40B4-BE49-F238E27FC236}">
+                <a16:creationId xmlns:a16="http://schemas.microsoft.com/office/drawing/2014/main" id="{EBE0E297-91EF-066D-47EF-BFE73830A7DB}"/>
+              </a:ext>
+            </a:extLst>
+          </p:cNvPr>
+          <p:cNvSpPr>
+            <a:spLocks noGrp="1"/>
+          </p:cNvSpPr>
+          <p:nvPr>
+            <p:ph type="title"/>
+          </p:nvPr>
+        </p:nvSpPr>
+        <p:spPr/>
+        <p:txBody>
+          <a:bodyPr/>
+          <a:lstStyle/>
+          <a:p>
+            <a:endParaRPr lang="zh-CN" altLang="en-US"/>
+          </a:p>
+        </p:txBody>
+      </p:sp>
+      <p:pic>
+        <p:nvPicPr>
+          <p:cNvPr id="6" name="内容占位符 5">
+            <a:extLst>
+              <a:ext uri="{FF2B5EF4-FFF2-40B4-BE49-F238E27FC236}">
+                <a16:creationId xmlns:a16="http://schemas.microsoft.com/office/drawing/2014/main" id="{CA2FDC61-0C01-0E1D-6174-507BA6DA2095}"/>
+              </a:ext>
+            </a:extLst>
+          </p:cNvPr>
+          <p:cNvPicPr>
+            <a:picLocks noGrp="1" noChangeAspect="1"/>
+          </p:cNvPicPr>
+          <p:nvPr>
+            <p:ph idx="1"/>
+          </p:nvPr>
+        </p:nvPicPr>
+        <p:blipFill>
+          <a:blip r:embed="rId2">
+            <a:extLst>
+              <a:ext uri="{28A0092B-C50C-407E-A947-70E740481C1C}">
+                <a14:useLocalDpi xmlns:a14="http://schemas.microsoft.com/office/drawing/2010/main" val="0"/>
+              </a:ext>
+            </a:extLst>
+          </a:blip>
+          <a:stretch>
+            <a:fillRect/>
+          </a:stretch>
+        </p:blipFill>
+        <p:spPr>
+          <a:xfrm>
+            <a:off x="685800" y="1530314"/>
+            <a:ext cx="7772400" cy="4025972"/>
+          </a:xfrm>
+        </p:spPr>
+      </p:pic>
+      <p:sp>
+        <p:nvSpPr>
+          <p:cNvPr id="4" name="灯片编号占位符 3">
+            <a:extLst>
+              <a:ext uri="{FF2B5EF4-FFF2-40B4-BE49-F238E27FC236}">
+                <a16:creationId xmlns:a16="http://schemas.microsoft.com/office/drawing/2014/main" id="{2262029F-AC96-72A3-5A4C-61C3D87E0C75}"/>
+              </a:ext>
+            </a:extLst>
+          </p:cNvPr>
+          <p:cNvSpPr>
+            <a:spLocks noGrp="1"/>
+          </p:cNvSpPr>
+          <p:nvPr>
+            <p:ph type="sldNum" sz="quarter" idx="12"/>
+          </p:nvPr>
+        </p:nvSpPr>
+        <p:spPr/>
+        <p:txBody>
+          <a:bodyPr/>
+          <a:lstStyle/>
+          <a:p>
+            <a:pPr>
+              <a:defRPr/>
+            </a:pPr>
+            <a:fld id="{A26A0649-E50C-4844-BD05-C05B747519B9}" type="slidenum">
+              <a:rPr lang="de-DE" altLang="en-US" smtClean="0"/>
+              <a:pPr>
+                <a:defRPr/>
+              </a:pPr>
+              <a:t>16</a:t>
+            </a:fld>
+            <a:endParaRPr lang="de-DE" altLang="en-US"/>
+          </a:p>
+        </p:txBody>
+      </p:sp>
+    </p:spTree>
+    <p:extLst>
+      <p:ext uri="{BB962C8B-B14F-4D97-AF65-F5344CB8AC3E}">
+        <p14:creationId xmlns:p14="http://schemas.microsoft.com/office/powerpoint/2010/main" val="1728119641"/>
+      </p:ext>
+    </p:extLst>
+  </p:cSld>
+  <p:clrMapOvr>
+    <a:masterClrMapping/>
+  </p:clrMapOvr>
+</p:sld>
+</file>
+
+<file path=ppt/slides/slide17.xml><?xml version="1.0" encoding="utf-8"?>
+<p:sld xmlns:a="http://schemas.openxmlformats.org/drawingml/2006/main" xmlns:r="http://schemas.openxmlformats.org/officeDocument/2006/relationships" xmlns:p="http://schemas.openxmlformats.org/presentationml/2006/main">
+  <p:cSld>
+    <p:spTree>
+      <p:nvGrpSpPr>
+        <p:cNvPr id="1" name=""/>
+        <p:cNvGrpSpPr/>
+        <p:nvPr/>
+      </p:nvGrpSpPr>
+      <p:grpSpPr>
+        <a:xfrm>
+          <a:off x="0" y="0"/>
+          <a:ext cx="0" cy="0"/>
+          <a:chOff x="0" y="0"/>
+          <a:chExt cx="0" cy="0"/>
+        </a:xfrm>
+      </p:grpSpPr>
+      <p:sp>
+        <p:nvSpPr>
+          <p:cNvPr id="2" name="标题 1">
+            <a:extLst>
+              <a:ext uri="{FF2B5EF4-FFF2-40B4-BE49-F238E27FC236}">
+                <a16:creationId xmlns:a16="http://schemas.microsoft.com/office/drawing/2014/main" id="{EBE0E297-91EF-066D-47EF-BFE73830A7DB}"/>
+              </a:ext>
+            </a:extLst>
+          </p:cNvPr>
+          <p:cNvSpPr>
+            <a:spLocks noGrp="1"/>
+          </p:cNvSpPr>
+          <p:nvPr>
+            <p:ph type="title"/>
+          </p:nvPr>
+        </p:nvSpPr>
+        <p:spPr/>
+        <p:txBody>
+          <a:bodyPr/>
+          <a:lstStyle/>
+          <a:p>
+            <a:endParaRPr lang="zh-CN" altLang="en-US"/>
+          </a:p>
+        </p:txBody>
+      </p:sp>
+      <p:sp>
+        <p:nvSpPr>
+          <p:cNvPr id="4" name="灯片编号占位符 3">
+            <a:extLst>
+              <a:ext uri="{FF2B5EF4-FFF2-40B4-BE49-F238E27FC236}">
+                <a16:creationId xmlns:a16="http://schemas.microsoft.com/office/drawing/2014/main" id="{2262029F-AC96-72A3-5A4C-61C3D87E0C75}"/>
+              </a:ext>
+            </a:extLst>
+          </p:cNvPr>
+          <p:cNvSpPr>
+            <a:spLocks noGrp="1"/>
+          </p:cNvSpPr>
+          <p:nvPr>
+            <p:ph type="sldNum" sz="quarter" idx="12"/>
+          </p:nvPr>
+        </p:nvSpPr>
+        <p:spPr/>
+        <p:txBody>
+          <a:bodyPr/>
+          <a:lstStyle/>
+          <a:p>
+            <a:pPr>
+              <a:defRPr/>
+            </a:pPr>
+            <a:fld id="{A26A0649-E50C-4844-BD05-C05B747519B9}" type="slidenum">
+              <a:rPr lang="de-DE" altLang="en-US" smtClean="0"/>
+              <a:pPr>
+                <a:defRPr/>
+              </a:pPr>
+              <a:t>17</a:t>
+            </a:fld>
+            <a:endParaRPr lang="de-DE" altLang="en-US"/>
+          </a:p>
+        </p:txBody>
+      </p:sp>
+      <p:pic>
+        <p:nvPicPr>
+          <p:cNvPr id="9" name="内容占位符 8" descr="图表, 图示&#10;&#10;描述已自动生成">
+            <a:extLst>
+              <a:ext uri="{FF2B5EF4-FFF2-40B4-BE49-F238E27FC236}">
+                <a16:creationId xmlns:a16="http://schemas.microsoft.com/office/drawing/2014/main" id="{CDDDF5DC-5D3D-0DD1-2F3B-CF5468E27642}"/>
+              </a:ext>
+            </a:extLst>
+          </p:cNvPr>
+          <p:cNvPicPr>
+            <a:picLocks noGrp="1" noChangeAspect="1"/>
+          </p:cNvPicPr>
+          <p:nvPr>
+            <p:ph idx="1"/>
+          </p:nvPr>
+        </p:nvPicPr>
+        <p:blipFill>
+          <a:blip r:embed="rId2">
+            <a:extLst>
+              <a:ext uri="{28A0092B-C50C-407E-A947-70E740481C1C}">
+                <a14:useLocalDpi xmlns:a14="http://schemas.microsoft.com/office/drawing/2010/main" val="0"/>
+              </a:ext>
+            </a:extLst>
+          </a:blip>
+          <a:stretch>
+            <a:fillRect/>
+          </a:stretch>
+        </p:blipFill>
+        <p:spPr>
+          <a:xfrm>
+            <a:off x="685800" y="1530314"/>
+            <a:ext cx="7772400" cy="4025972"/>
+          </a:xfrm>
+        </p:spPr>
+      </p:pic>
+    </p:spTree>
+    <p:extLst>
+      <p:ext uri="{BB962C8B-B14F-4D97-AF65-F5344CB8AC3E}">
+        <p14:creationId xmlns:p14="http://schemas.microsoft.com/office/powerpoint/2010/main" val="2518948389"/>
+      </p:ext>
+    </p:extLst>
+  </p:cSld>
+  <p:clrMapOvr>
+    <a:masterClrMapping/>
+  </p:clrMapOvr>
+</p:sld>
+</file>
+
+<file path=ppt/slides/slide18.xml><?xml version="1.0" encoding="utf-8"?>
 <p:sld xmlns:a="http://schemas.openxmlformats.org/drawingml/2006/main" xmlns:r="http://schemas.openxmlformats.org/officeDocument/2006/relationships" xmlns:p="http://schemas.openxmlformats.org/presentationml/2006/main">
   <p:cSld>
     <p:spTree>
@@ -5271,7 +6947,7 @@
                 <a:latin typeface="Univers" panose="020B0503020202020204" pitchFamily="34" charset="0"/>
               </a:rPr>
               <a:pPr/>
-              <a:t>2</a:t>
+              <a:t>18</a:t>
             </a:fld>
             <a:endParaRPr lang="de-DE" altLang="en-US" sz="1400">
               <a:solidFill>
@@ -5283,6 +6959,1038 @@
         </p:txBody>
       </p:sp>
     </p:spTree>
+  </p:cSld>
+  <p:clrMapOvr>
+    <a:masterClrMapping/>
+  </p:clrMapOvr>
+</p:sld>
+</file>
+
+<file path=ppt/slides/slide2.xml><?xml version="1.0" encoding="utf-8"?>
+<p:sld xmlns:a="http://schemas.openxmlformats.org/drawingml/2006/main" xmlns:r="http://schemas.openxmlformats.org/officeDocument/2006/relationships" xmlns:p="http://schemas.openxmlformats.org/presentationml/2006/main">
+  <p:cSld>
+    <p:spTree>
+      <p:nvGrpSpPr>
+        <p:cNvPr id="1" name=""/>
+        <p:cNvGrpSpPr/>
+        <p:nvPr/>
+      </p:nvGrpSpPr>
+      <p:grpSpPr>
+        <a:xfrm>
+          <a:off x="0" y="0"/>
+          <a:ext cx="0" cy="0"/>
+          <a:chOff x="0" y="0"/>
+          <a:chExt cx="0" cy="0"/>
+        </a:xfrm>
+      </p:grpSpPr>
+      <p:sp>
+        <p:nvSpPr>
+          <p:cNvPr id="2" name="标题 1">
+            <a:extLst>
+              <a:ext uri="{FF2B5EF4-FFF2-40B4-BE49-F238E27FC236}">
+                <a16:creationId xmlns:a16="http://schemas.microsoft.com/office/drawing/2014/main" id="{C8259257-40E8-4D41-0328-94AA32F21BAC}"/>
+              </a:ext>
+            </a:extLst>
+          </p:cNvPr>
+          <p:cNvSpPr>
+            <a:spLocks noGrp="1"/>
+          </p:cNvSpPr>
+          <p:nvPr>
+            <p:ph type="title"/>
+          </p:nvPr>
+        </p:nvSpPr>
+        <p:spPr/>
+        <p:txBody>
+          <a:bodyPr/>
+          <a:lstStyle/>
+          <a:p>
+            <a:r>
+              <a:rPr lang="en-US" altLang="zh-CN" dirty="0"/>
+              <a:t>GOCE</a:t>
+            </a:r>
+            <a:endParaRPr lang="zh-CN" altLang="en-US" dirty="0"/>
+          </a:p>
+        </p:txBody>
+      </p:sp>
+      <p:pic>
+        <p:nvPicPr>
+          <p:cNvPr id="6" name="内容占位符 5" descr="图表&#10;&#10;描述已自动生成">
+            <a:extLst>
+              <a:ext uri="{FF2B5EF4-FFF2-40B4-BE49-F238E27FC236}">
+                <a16:creationId xmlns:a16="http://schemas.microsoft.com/office/drawing/2014/main" id="{1A038686-1F3A-C8B8-E5CD-CE841FD650E5}"/>
+              </a:ext>
+            </a:extLst>
+          </p:cNvPr>
+          <p:cNvPicPr>
+            <a:picLocks noGrp="1" noChangeAspect="1"/>
+          </p:cNvPicPr>
+          <p:nvPr>
+            <p:ph idx="1"/>
+          </p:nvPr>
+        </p:nvPicPr>
+        <p:blipFill>
+          <a:blip r:embed="rId2">
+            <a:extLst>
+              <a:ext uri="{28A0092B-C50C-407E-A947-70E740481C1C}">
+                <a14:useLocalDpi xmlns:a14="http://schemas.microsoft.com/office/drawing/2010/main" val="0"/>
+              </a:ext>
+            </a:extLst>
+          </a:blip>
+          <a:stretch>
+            <a:fillRect/>
+          </a:stretch>
+        </p:blipFill>
+        <p:spPr>
+          <a:xfrm>
+            <a:off x="685800" y="1530314"/>
+            <a:ext cx="7772400" cy="4025972"/>
+          </a:xfrm>
+        </p:spPr>
+      </p:pic>
+      <p:sp>
+        <p:nvSpPr>
+          <p:cNvPr id="4" name="灯片编号占位符 3">
+            <a:extLst>
+              <a:ext uri="{FF2B5EF4-FFF2-40B4-BE49-F238E27FC236}">
+                <a16:creationId xmlns:a16="http://schemas.microsoft.com/office/drawing/2014/main" id="{9236C1A5-FEF2-6D2B-B9A1-0220C1AD6349}"/>
+              </a:ext>
+            </a:extLst>
+          </p:cNvPr>
+          <p:cNvSpPr>
+            <a:spLocks noGrp="1"/>
+          </p:cNvSpPr>
+          <p:nvPr>
+            <p:ph type="sldNum" sz="quarter" idx="12"/>
+          </p:nvPr>
+        </p:nvSpPr>
+        <p:spPr/>
+        <p:txBody>
+          <a:bodyPr/>
+          <a:lstStyle/>
+          <a:p>
+            <a:pPr>
+              <a:defRPr/>
+            </a:pPr>
+            <a:fld id="{A26A0649-E50C-4844-BD05-C05B747519B9}" type="slidenum">
+              <a:rPr lang="de-DE" altLang="en-US" smtClean="0"/>
+              <a:pPr>
+                <a:defRPr/>
+              </a:pPr>
+              <a:t>2</a:t>
+            </a:fld>
+            <a:endParaRPr lang="de-DE" altLang="en-US"/>
+          </a:p>
+        </p:txBody>
+      </p:sp>
+    </p:spTree>
+    <p:extLst>
+      <p:ext uri="{BB962C8B-B14F-4D97-AF65-F5344CB8AC3E}">
+        <p14:creationId xmlns:p14="http://schemas.microsoft.com/office/powerpoint/2010/main" val="3133153608"/>
+      </p:ext>
+    </p:extLst>
+  </p:cSld>
+  <p:clrMapOvr>
+    <a:masterClrMapping/>
+  </p:clrMapOvr>
+</p:sld>
+</file>
+
+<file path=ppt/slides/slide3.xml><?xml version="1.0" encoding="utf-8"?>
+<p:sld xmlns:a="http://schemas.openxmlformats.org/drawingml/2006/main" xmlns:r="http://schemas.openxmlformats.org/officeDocument/2006/relationships" xmlns:p="http://schemas.openxmlformats.org/presentationml/2006/main">
+  <p:cSld>
+    <p:spTree>
+      <p:nvGrpSpPr>
+        <p:cNvPr id="1" name=""/>
+        <p:cNvGrpSpPr/>
+        <p:nvPr/>
+      </p:nvGrpSpPr>
+      <p:grpSpPr>
+        <a:xfrm>
+          <a:off x="0" y="0"/>
+          <a:ext cx="0" cy="0"/>
+          <a:chOff x="0" y="0"/>
+          <a:chExt cx="0" cy="0"/>
+        </a:xfrm>
+      </p:grpSpPr>
+      <p:sp>
+        <p:nvSpPr>
+          <p:cNvPr id="2" name="标题 1">
+            <a:extLst>
+              <a:ext uri="{FF2B5EF4-FFF2-40B4-BE49-F238E27FC236}">
+                <a16:creationId xmlns:a16="http://schemas.microsoft.com/office/drawing/2014/main" id="{577C4C4A-CBE8-AACA-407C-459DDE866F41}"/>
+              </a:ext>
+            </a:extLst>
+          </p:cNvPr>
+          <p:cNvSpPr>
+            <a:spLocks noGrp="1"/>
+          </p:cNvSpPr>
+          <p:nvPr>
+            <p:ph type="title"/>
+          </p:nvPr>
+        </p:nvSpPr>
+        <p:spPr/>
+        <p:txBody>
+          <a:bodyPr/>
+          <a:lstStyle/>
+          <a:p>
+            <a:r>
+              <a:rPr lang="en-US" altLang="zh-CN" dirty="0"/>
+              <a:t>GOCE</a:t>
+            </a:r>
+            <a:endParaRPr lang="zh-CN" altLang="en-US" dirty="0"/>
+          </a:p>
+        </p:txBody>
+      </p:sp>
+      <p:sp>
+        <p:nvSpPr>
+          <p:cNvPr id="4" name="灯片编号占位符 3">
+            <a:extLst>
+              <a:ext uri="{FF2B5EF4-FFF2-40B4-BE49-F238E27FC236}">
+                <a16:creationId xmlns:a16="http://schemas.microsoft.com/office/drawing/2014/main" id="{0D475FF9-D883-1966-4EC8-35E60844A6AA}"/>
+              </a:ext>
+            </a:extLst>
+          </p:cNvPr>
+          <p:cNvSpPr>
+            <a:spLocks noGrp="1"/>
+          </p:cNvSpPr>
+          <p:nvPr>
+            <p:ph type="sldNum" sz="quarter" idx="12"/>
+          </p:nvPr>
+        </p:nvSpPr>
+        <p:spPr/>
+        <p:txBody>
+          <a:bodyPr/>
+          <a:lstStyle/>
+          <a:p>
+            <a:pPr>
+              <a:defRPr/>
+            </a:pPr>
+            <a:fld id="{A26A0649-E50C-4844-BD05-C05B747519B9}" type="slidenum">
+              <a:rPr lang="de-DE" altLang="en-US" smtClean="0"/>
+              <a:pPr>
+                <a:defRPr/>
+              </a:pPr>
+              <a:t>3</a:t>
+            </a:fld>
+            <a:endParaRPr lang="de-DE" altLang="en-US"/>
+          </a:p>
+        </p:txBody>
+      </p:sp>
+      <p:pic>
+        <p:nvPicPr>
+          <p:cNvPr id="12" name="内容占位符 11" descr="图形用户界面, 图表&#10;&#10;描述已自动生成">
+            <a:extLst>
+              <a:ext uri="{FF2B5EF4-FFF2-40B4-BE49-F238E27FC236}">
+                <a16:creationId xmlns:a16="http://schemas.microsoft.com/office/drawing/2014/main" id="{B7BC2482-AF17-637E-CE04-647879DF4C48}"/>
+              </a:ext>
+            </a:extLst>
+          </p:cNvPr>
+          <p:cNvPicPr>
+            <a:picLocks noGrp="1" noChangeAspect="1"/>
+          </p:cNvPicPr>
+          <p:nvPr>
+            <p:ph idx="1"/>
+          </p:nvPr>
+        </p:nvPicPr>
+        <p:blipFill>
+          <a:blip r:embed="rId2">
+            <a:extLst>
+              <a:ext uri="{28A0092B-C50C-407E-A947-70E740481C1C}">
+                <a14:useLocalDpi xmlns:a14="http://schemas.microsoft.com/office/drawing/2010/main" val="0"/>
+              </a:ext>
+            </a:extLst>
+          </a:blip>
+          <a:stretch>
+            <a:fillRect/>
+          </a:stretch>
+        </p:blipFill>
+        <p:spPr>
+          <a:xfrm>
+            <a:off x="685800" y="1530314"/>
+            <a:ext cx="7772400" cy="4025972"/>
+          </a:xfrm>
+        </p:spPr>
+      </p:pic>
+    </p:spTree>
+    <p:extLst>
+      <p:ext uri="{BB962C8B-B14F-4D97-AF65-F5344CB8AC3E}">
+        <p14:creationId xmlns:p14="http://schemas.microsoft.com/office/powerpoint/2010/main" val="3169940856"/>
+      </p:ext>
+    </p:extLst>
+  </p:cSld>
+  <p:clrMapOvr>
+    <a:masterClrMapping/>
+  </p:clrMapOvr>
+</p:sld>
+</file>
+
+<file path=ppt/slides/slide4.xml><?xml version="1.0" encoding="utf-8"?>
+<p:sld xmlns:a="http://schemas.openxmlformats.org/drawingml/2006/main" xmlns:r="http://schemas.openxmlformats.org/officeDocument/2006/relationships" xmlns:p="http://schemas.openxmlformats.org/presentationml/2006/main">
+  <p:cSld>
+    <p:spTree>
+      <p:nvGrpSpPr>
+        <p:cNvPr id="1" name=""/>
+        <p:cNvGrpSpPr/>
+        <p:nvPr/>
+      </p:nvGrpSpPr>
+      <p:grpSpPr>
+        <a:xfrm>
+          <a:off x="0" y="0"/>
+          <a:ext cx="0" cy="0"/>
+          <a:chOff x="0" y="0"/>
+          <a:chExt cx="0" cy="0"/>
+        </a:xfrm>
+      </p:grpSpPr>
+      <p:sp>
+        <p:nvSpPr>
+          <p:cNvPr id="2" name="标题 1">
+            <a:extLst>
+              <a:ext uri="{FF2B5EF4-FFF2-40B4-BE49-F238E27FC236}">
+                <a16:creationId xmlns:a16="http://schemas.microsoft.com/office/drawing/2014/main" id="{EF29CCBF-4086-FF13-3C2F-26F4D2EACF71}"/>
+              </a:ext>
+            </a:extLst>
+          </p:cNvPr>
+          <p:cNvSpPr>
+            <a:spLocks noGrp="1"/>
+          </p:cNvSpPr>
+          <p:nvPr>
+            <p:ph type="title"/>
+          </p:nvPr>
+        </p:nvSpPr>
+        <p:spPr/>
+        <p:txBody>
+          <a:bodyPr/>
+          <a:lstStyle/>
+          <a:p>
+            <a:r>
+              <a:rPr lang="en-US" altLang="zh-CN" dirty="0"/>
+              <a:t>GRACE-1</a:t>
+            </a:r>
+            <a:endParaRPr lang="zh-CN" altLang="en-US" dirty="0"/>
+          </a:p>
+        </p:txBody>
+      </p:sp>
+      <p:sp>
+        <p:nvSpPr>
+          <p:cNvPr id="4" name="灯片编号占位符 3">
+            <a:extLst>
+              <a:ext uri="{FF2B5EF4-FFF2-40B4-BE49-F238E27FC236}">
+                <a16:creationId xmlns:a16="http://schemas.microsoft.com/office/drawing/2014/main" id="{FF17FD67-222F-1E11-5BFF-C80440DBA529}"/>
+              </a:ext>
+            </a:extLst>
+          </p:cNvPr>
+          <p:cNvSpPr>
+            <a:spLocks noGrp="1"/>
+          </p:cNvSpPr>
+          <p:nvPr>
+            <p:ph type="sldNum" sz="quarter" idx="12"/>
+          </p:nvPr>
+        </p:nvSpPr>
+        <p:spPr/>
+        <p:txBody>
+          <a:bodyPr/>
+          <a:lstStyle/>
+          <a:p>
+            <a:pPr>
+              <a:defRPr/>
+            </a:pPr>
+            <a:fld id="{A26A0649-E50C-4844-BD05-C05B747519B9}" type="slidenum">
+              <a:rPr lang="de-DE" altLang="en-US" smtClean="0"/>
+              <a:pPr>
+                <a:defRPr/>
+              </a:pPr>
+              <a:t>4</a:t>
+            </a:fld>
+            <a:endParaRPr lang="de-DE" altLang="en-US"/>
+          </a:p>
+        </p:txBody>
+      </p:sp>
+      <p:pic>
+        <p:nvPicPr>
+          <p:cNvPr id="9" name="内容占位符 8" descr="日程表&#10;&#10;描述已自动生成">
+            <a:extLst>
+              <a:ext uri="{FF2B5EF4-FFF2-40B4-BE49-F238E27FC236}">
+                <a16:creationId xmlns:a16="http://schemas.microsoft.com/office/drawing/2014/main" id="{DC995623-89DC-B3B3-5F26-CD20201925B0}"/>
+              </a:ext>
+            </a:extLst>
+          </p:cNvPr>
+          <p:cNvPicPr>
+            <a:picLocks noGrp="1" noChangeAspect="1"/>
+          </p:cNvPicPr>
+          <p:nvPr>
+            <p:ph idx="1"/>
+          </p:nvPr>
+        </p:nvPicPr>
+        <p:blipFill>
+          <a:blip r:embed="rId2">
+            <a:extLst>
+              <a:ext uri="{28A0092B-C50C-407E-A947-70E740481C1C}">
+                <a14:useLocalDpi xmlns:a14="http://schemas.microsoft.com/office/drawing/2010/main" val="0"/>
+              </a:ext>
+            </a:extLst>
+          </a:blip>
+          <a:stretch>
+            <a:fillRect/>
+          </a:stretch>
+        </p:blipFill>
+        <p:spPr>
+          <a:xfrm>
+            <a:off x="685800" y="1530314"/>
+            <a:ext cx="7772400" cy="4025972"/>
+          </a:xfrm>
+        </p:spPr>
+      </p:pic>
+    </p:spTree>
+    <p:extLst>
+      <p:ext uri="{BB962C8B-B14F-4D97-AF65-F5344CB8AC3E}">
+        <p14:creationId xmlns:p14="http://schemas.microsoft.com/office/powerpoint/2010/main" val="2557793898"/>
+      </p:ext>
+    </p:extLst>
+  </p:cSld>
+  <p:clrMapOvr>
+    <a:masterClrMapping/>
+  </p:clrMapOvr>
+</p:sld>
+</file>
+
+<file path=ppt/slides/slide5.xml><?xml version="1.0" encoding="utf-8"?>
+<p:sld xmlns:a="http://schemas.openxmlformats.org/drawingml/2006/main" xmlns:r="http://schemas.openxmlformats.org/officeDocument/2006/relationships" xmlns:p="http://schemas.openxmlformats.org/presentationml/2006/main">
+  <p:cSld>
+    <p:spTree>
+      <p:nvGrpSpPr>
+        <p:cNvPr id="1" name=""/>
+        <p:cNvGrpSpPr/>
+        <p:nvPr/>
+      </p:nvGrpSpPr>
+      <p:grpSpPr>
+        <a:xfrm>
+          <a:off x="0" y="0"/>
+          <a:ext cx="0" cy="0"/>
+          <a:chOff x="0" y="0"/>
+          <a:chExt cx="0" cy="0"/>
+        </a:xfrm>
+      </p:grpSpPr>
+      <p:sp>
+        <p:nvSpPr>
+          <p:cNvPr id="2" name="标题 1">
+            <a:extLst>
+              <a:ext uri="{FF2B5EF4-FFF2-40B4-BE49-F238E27FC236}">
+                <a16:creationId xmlns:a16="http://schemas.microsoft.com/office/drawing/2014/main" id="{A111A785-56BE-63D2-71FD-668E46697B3E}"/>
+              </a:ext>
+            </a:extLst>
+          </p:cNvPr>
+          <p:cNvSpPr>
+            <a:spLocks noGrp="1"/>
+          </p:cNvSpPr>
+          <p:nvPr>
+            <p:ph type="title"/>
+          </p:nvPr>
+        </p:nvSpPr>
+        <p:spPr/>
+        <p:txBody>
+          <a:bodyPr/>
+          <a:lstStyle/>
+          <a:p>
+            <a:r>
+              <a:rPr lang="en-US" altLang="zh-CN" dirty="0"/>
+              <a:t>GRACE-1</a:t>
+            </a:r>
+            <a:endParaRPr lang="zh-CN" altLang="en-US" dirty="0"/>
+          </a:p>
+        </p:txBody>
+      </p:sp>
+      <p:pic>
+        <p:nvPicPr>
+          <p:cNvPr id="6" name="内容占位符 5" descr="图表&#10;&#10;描述已自动生成">
+            <a:extLst>
+              <a:ext uri="{FF2B5EF4-FFF2-40B4-BE49-F238E27FC236}">
+                <a16:creationId xmlns:a16="http://schemas.microsoft.com/office/drawing/2014/main" id="{21C028FB-D9A5-7740-29F4-7269C95D7BC0}"/>
+              </a:ext>
+            </a:extLst>
+          </p:cNvPr>
+          <p:cNvPicPr>
+            <a:picLocks noGrp="1" noChangeAspect="1"/>
+          </p:cNvPicPr>
+          <p:nvPr>
+            <p:ph idx="1"/>
+          </p:nvPr>
+        </p:nvPicPr>
+        <p:blipFill>
+          <a:blip r:embed="rId2">
+            <a:extLst>
+              <a:ext uri="{28A0092B-C50C-407E-A947-70E740481C1C}">
+                <a14:useLocalDpi xmlns:a14="http://schemas.microsoft.com/office/drawing/2010/main" val="0"/>
+              </a:ext>
+            </a:extLst>
+          </a:blip>
+          <a:stretch>
+            <a:fillRect/>
+          </a:stretch>
+        </p:blipFill>
+        <p:spPr>
+          <a:xfrm>
+            <a:off x="685800" y="1530314"/>
+            <a:ext cx="7772400" cy="4025972"/>
+          </a:xfrm>
+        </p:spPr>
+      </p:pic>
+      <p:sp>
+        <p:nvSpPr>
+          <p:cNvPr id="4" name="灯片编号占位符 3">
+            <a:extLst>
+              <a:ext uri="{FF2B5EF4-FFF2-40B4-BE49-F238E27FC236}">
+                <a16:creationId xmlns:a16="http://schemas.microsoft.com/office/drawing/2014/main" id="{139D36FF-34B4-F1E5-1346-21F3761E2DD1}"/>
+              </a:ext>
+            </a:extLst>
+          </p:cNvPr>
+          <p:cNvSpPr>
+            <a:spLocks noGrp="1"/>
+          </p:cNvSpPr>
+          <p:nvPr>
+            <p:ph type="sldNum" sz="quarter" idx="12"/>
+          </p:nvPr>
+        </p:nvSpPr>
+        <p:spPr/>
+        <p:txBody>
+          <a:bodyPr/>
+          <a:lstStyle/>
+          <a:p>
+            <a:pPr>
+              <a:defRPr/>
+            </a:pPr>
+            <a:fld id="{A26A0649-E50C-4844-BD05-C05B747519B9}" type="slidenum">
+              <a:rPr lang="de-DE" altLang="en-US" smtClean="0"/>
+              <a:pPr>
+                <a:defRPr/>
+              </a:pPr>
+              <a:t>5</a:t>
+            </a:fld>
+            <a:endParaRPr lang="de-DE" altLang="en-US"/>
+          </a:p>
+        </p:txBody>
+      </p:sp>
+    </p:spTree>
+    <p:extLst>
+      <p:ext uri="{BB962C8B-B14F-4D97-AF65-F5344CB8AC3E}">
+        <p14:creationId xmlns:p14="http://schemas.microsoft.com/office/powerpoint/2010/main" val="2350780990"/>
+      </p:ext>
+    </p:extLst>
+  </p:cSld>
+  <p:clrMapOvr>
+    <a:masterClrMapping/>
+  </p:clrMapOvr>
+</p:sld>
+</file>
+
+<file path=ppt/slides/slide6.xml><?xml version="1.0" encoding="utf-8"?>
+<p:sld xmlns:a="http://schemas.openxmlformats.org/drawingml/2006/main" xmlns:r="http://schemas.openxmlformats.org/officeDocument/2006/relationships" xmlns:p="http://schemas.openxmlformats.org/presentationml/2006/main">
+  <p:cSld>
+    <p:spTree>
+      <p:nvGrpSpPr>
+        <p:cNvPr id="1" name=""/>
+        <p:cNvGrpSpPr/>
+        <p:nvPr/>
+      </p:nvGrpSpPr>
+      <p:grpSpPr>
+        <a:xfrm>
+          <a:off x="0" y="0"/>
+          <a:ext cx="0" cy="0"/>
+          <a:chOff x="0" y="0"/>
+          <a:chExt cx="0" cy="0"/>
+        </a:xfrm>
+      </p:grpSpPr>
+      <p:sp>
+        <p:nvSpPr>
+          <p:cNvPr id="2" name="标题 1">
+            <a:extLst>
+              <a:ext uri="{FF2B5EF4-FFF2-40B4-BE49-F238E27FC236}">
+                <a16:creationId xmlns:a16="http://schemas.microsoft.com/office/drawing/2014/main" id="{EBE0E297-91EF-066D-47EF-BFE73830A7DB}"/>
+              </a:ext>
+            </a:extLst>
+          </p:cNvPr>
+          <p:cNvSpPr>
+            <a:spLocks noGrp="1"/>
+          </p:cNvSpPr>
+          <p:nvPr>
+            <p:ph type="title"/>
+          </p:nvPr>
+        </p:nvSpPr>
+        <p:spPr/>
+        <p:txBody>
+          <a:bodyPr/>
+          <a:lstStyle/>
+          <a:p>
+            <a:r>
+              <a:rPr lang="en-US" altLang="zh-CN" dirty="0"/>
+              <a:t>Sentinel-3A</a:t>
+            </a:r>
+            <a:endParaRPr lang="zh-CN" altLang="en-US" dirty="0"/>
+          </a:p>
+        </p:txBody>
+      </p:sp>
+      <p:pic>
+        <p:nvPicPr>
+          <p:cNvPr id="6" name="内容占位符 5" descr="文本&#10;&#10;描述已自动生成">
+            <a:extLst>
+              <a:ext uri="{FF2B5EF4-FFF2-40B4-BE49-F238E27FC236}">
+                <a16:creationId xmlns:a16="http://schemas.microsoft.com/office/drawing/2014/main" id="{DE71C3DC-3A1A-3419-3FAF-6C4758312FF0}"/>
+              </a:ext>
+            </a:extLst>
+          </p:cNvPr>
+          <p:cNvPicPr>
+            <a:picLocks noGrp="1" noChangeAspect="1"/>
+          </p:cNvPicPr>
+          <p:nvPr>
+            <p:ph idx="1"/>
+          </p:nvPr>
+        </p:nvPicPr>
+        <p:blipFill>
+          <a:blip r:embed="rId2">
+            <a:extLst>
+              <a:ext uri="{28A0092B-C50C-407E-A947-70E740481C1C}">
+                <a14:useLocalDpi xmlns:a14="http://schemas.microsoft.com/office/drawing/2010/main" val="0"/>
+              </a:ext>
+            </a:extLst>
+          </a:blip>
+          <a:stretch>
+            <a:fillRect/>
+          </a:stretch>
+        </p:blipFill>
+        <p:spPr>
+          <a:xfrm>
+            <a:off x="685800" y="1530804"/>
+            <a:ext cx="7772400" cy="4024992"/>
+          </a:xfrm>
+        </p:spPr>
+      </p:pic>
+      <p:sp>
+        <p:nvSpPr>
+          <p:cNvPr id="4" name="灯片编号占位符 3">
+            <a:extLst>
+              <a:ext uri="{FF2B5EF4-FFF2-40B4-BE49-F238E27FC236}">
+                <a16:creationId xmlns:a16="http://schemas.microsoft.com/office/drawing/2014/main" id="{2262029F-AC96-72A3-5A4C-61C3D87E0C75}"/>
+              </a:ext>
+            </a:extLst>
+          </p:cNvPr>
+          <p:cNvSpPr>
+            <a:spLocks noGrp="1"/>
+          </p:cNvSpPr>
+          <p:nvPr>
+            <p:ph type="sldNum" sz="quarter" idx="12"/>
+          </p:nvPr>
+        </p:nvSpPr>
+        <p:spPr/>
+        <p:txBody>
+          <a:bodyPr/>
+          <a:lstStyle/>
+          <a:p>
+            <a:pPr>
+              <a:defRPr/>
+            </a:pPr>
+            <a:fld id="{A26A0649-E50C-4844-BD05-C05B747519B9}" type="slidenum">
+              <a:rPr lang="de-DE" altLang="en-US" smtClean="0"/>
+              <a:pPr>
+                <a:defRPr/>
+              </a:pPr>
+              <a:t>6</a:t>
+            </a:fld>
+            <a:endParaRPr lang="de-DE" altLang="en-US"/>
+          </a:p>
+        </p:txBody>
+      </p:sp>
+    </p:spTree>
+    <p:extLst>
+      <p:ext uri="{BB962C8B-B14F-4D97-AF65-F5344CB8AC3E}">
+        <p14:creationId xmlns:p14="http://schemas.microsoft.com/office/powerpoint/2010/main" val="758564445"/>
+      </p:ext>
+    </p:extLst>
+  </p:cSld>
+  <p:clrMapOvr>
+    <a:masterClrMapping/>
+  </p:clrMapOvr>
+</p:sld>
+</file>
+
+<file path=ppt/slides/slide7.xml><?xml version="1.0" encoding="utf-8"?>
+<p:sld xmlns:a="http://schemas.openxmlformats.org/drawingml/2006/main" xmlns:r="http://schemas.openxmlformats.org/officeDocument/2006/relationships" xmlns:p="http://schemas.openxmlformats.org/presentationml/2006/main">
+  <p:cSld>
+    <p:spTree>
+      <p:nvGrpSpPr>
+        <p:cNvPr id="1" name=""/>
+        <p:cNvGrpSpPr/>
+        <p:nvPr/>
+      </p:nvGrpSpPr>
+      <p:grpSpPr>
+        <a:xfrm>
+          <a:off x="0" y="0"/>
+          <a:ext cx="0" cy="0"/>
+          <a:chOff x="0" y="0"/>
+          <a:chExt cx="0" cy="0"/>
+        </a:xfrm>
+      </p:grpSpPr>
+      <p:sp>
+        <p:nvSpPr>
+          <p:cNvPr id="2" name="标题 1">
+            <a:extLst>
+              <a:ext uri="{FF2B5EF4-FFF2-40B4-BE49-F238E27FC236}">
+                <a16:creationId xmlns:a16="http://schemas.microsoft.com/office/drawing/2014/main" id="{EBE0E297-91EF-066D-47EF-BFE73830A7DB}"/>
+              </a:ext>
+            </a:extLst>
+          </p:cNvPr>
+          <p:cNvSpPr>
+            <a:spLocks noGrp="1"/>
+          </p:cNvSpPr>
+          <p:nvPr>
+            <p:ph type="title"/>
+          </p:nvPr>
+        </p:nvSpPr>
+        <p:spPr/>
+        <p:txBody>
+          <a:bodyPr/>
+          <a:lstStyle/>
+          <a:p>
+            <a:r>
+              <a:rPr lang="en-US" altLang="zh-CN" dirty="0"/>
+              <a:t>Sentinel-3A</a:t>
+            </a:r>
+            <a:endParaRPr lang="zh-CN" altLang="en-US" dirty="0"/>
+          </a:p>
+        </p:txBody>
+      </p:sp>
+      <p:pic>
+        <p:nvPicPr>
+          <p:cNvPr id="6" name="内容占位符 5" descr="图表, 散点图&#10;&#10;描述已自动生成">
+            <a:extLst>
+              <a:ext uri="{FF2B5EF4-FFF2-40B4-BE49-F238E27FC236}">
+                <a16:creationId xmlns:a16="http://schemas.microsoft.com/office/drawing/2014/main" id="{D5FD4549-DD9A-03ED-B04B-553D9205D9E5}"/>
+              </a:ext>
+            </a:extLst>
+          </p:cNvPr>
+          <p:cNvPicPr>
+            <a:picLocks noGrp="1" noChangeAspect="1"/>
+          </p:cNvPicPr>
+          <p:nvPr>
+            <p:ph idx="1"/>
+          </p:nvPr>
+        </p:nvPicPr>
+        <p:blipFill>
+          <a:blip r:embed="rId2">
+            <a:extLst>
+              <a:ext uri="{28A0092B-C50C-407E-A947-70E740481C1C}">
+                <a14:useLocalDpi xmlns:a14="http://schemas.microsoft.com/office/drawing/2010/main" val="0"/>
+              </a:ext>
+            </a:extLst>
+          </a:blip>
+          <a:stretch>
+            <a:fillRect/>
+          </a:stretch>
+        </p:blipFill>
+        <p:spPr>
+          <a:xfrm>
+            <a:off x="685800" y="1530314"/>
+            <a:ext cx="7772400" cy="4025972"/>
+          </a:xfrm>
+        </p:spPr>
+      </p:pic>
+      <p:sp>
+        <p:nvSpPr>
+          <p:cNvPr id="4" name="灯片编号占位符 3">
+            <a:extLst>
+              <a:ext uri="{FF2B5EF4-FFF2-40B4-BE49-F238E27FC236}">
+                <a16:creationId xmlns:a16="http://schemas.microsoft.com/office/drawing/2014/main" id="{2262029F-AC96-72A3-5A4C-61C3D87E0C75}"/>
+              </a:ext>
+            </a:extLst>
+          </p:cNvPr>
+          <p:cNvSpPr>
+            <a:spLocks noGrp="1"/>
+          </p:cNvSpPr>
+          <p:nvPr>
+            <p:ph type="sldNum" sz="quarter" idx="12"/>
+          </p:nvPr>
+        </p:nvSpPr>
+        <p:spPr/>
+        <p:txBody>
+          <a:bodyPr/>
+          <a:lstStyle/>
+          <a:p>
+            <a:pPr>
+              <a:defRPr/>
+            </a:pPr>
+            <a:fld id="{A26A0649-E50C-4844-BD05-C05B747519B9}" type="slidenum">
+              <a:rPr lang="de-DE" altLang="en-US" smtClean="0"/>
+              <a:pPr>
+                <a:defRPr/>
+              </a:pPr>
+              <a:t>7</a:t>
+            </a:fld>
+            <a:endParaRPr lang="de-DE" altLang="en-US"/>
+          </a:p>
+        </p:txBody>
+      </p:sp>
+    </p:spTree>
+    <p:extLst>
+      <p:ext uri="{BB962C8B-B14F-4D97-AF65-F5344CB8AC3E}">
+        <p14:creationId xmlns:p14="http://schemas.microsoft.com/office/powerpoint/2010/main" val="18036196"/>
+      </p:ext>
+    </p:extLst>
+  </p:cSld>
+  <p:clrMapOvr>
+    <a:masterClrMapping/>
+  </p:clrMapOvr>
+</p:sld>
+</file>
+
+<file path=ppt/slides/slide8.xml><?xml version="1.0" encoding="utf-8"?>
+<p:sld xmlns:a="http://schemas.openxmlformats.org/drawingml/2006/main" xmlns:r="http://schemas.openxmlformats.org/officeDocument/2006/relationships" xmlns:p="http://schemas.openxmlformats.org/presentationml/2006/main">
+  <p:cSld>
+    <p:spTree>
+      <p:nvGrpSpPr>
+        <p:cNvPr id="1" name=""/>
+        <p:cNvGrpSpPr/>
+        <p:nvPr/>
+      </p:nvGrpSpPr>
+      <p:grpSpPr>
+        <a:xfrm>
+          <a:off x="0" y="0"/>
+          <a:ext cx="0" cy="0"/>
+          <a:chOff x="0" y="0"/>
+          <a:chExt cx="0" cy="0"/>
+        </a:xfrm>
+      </p:grpSpPr>
+      <p:sp>
+        <p:nvSpPr>
+          <p:cNvPr id="2" name="标题 1">
+            <a:extLst>
+              <a:ext uri="{FF2B5EF4-FFF2-40B4-BE49-F238E27FC236}">
+                <a16:creationId xmlns:a16="http://schemas.microsoft.com/office/drawing/2014/main" id="{EBE0E297-91EF-066D-47EF-BFE73830A7DB}"/>
+              </a:ext>
+            </a:extLst>
+          </p:cNvPr>
+          <p:cNvSpPr>
+            <a:spLocks noGrp="1"/>
+          </p:cNvSpPr>
+          <p:nvPr>
+            <p:ph type="title"/>
+          </p:nvPr>
+        </p:nvSpPr>
+        <p:spPr/>
+        <p:txBody>
+          <a:bodyPr/>
+          <a:lstStyle/>
+          <a:p>
+            <a:r>
+              <a:rPr lang="en-US" altLang="zh-CN" dirty="0"/>
+              <a:t>Sentinel-3B</a:t>
+            </a:r>
+            <a:endParaRPr lang="zh-CN" altLang="en-US" dirty="0"/>
+          </a:p>
+        </p:txBody>
+      </p:sp>
+      <p:pic>
+        <p:nvPicPr>
+          <p:cNvPr id="6" name="内容占位符 5">
+            <a:extLst>
+              <a:ext uri="{FF2B5EF4-FFF2-40B4-BE49-F238E27FC236}">
+                <a16:creationId xmlns:a16="http://schemas.microsoft.com/office/drawing/2014/main" id="{9D32E5DE-CAEB-E0FF-5194-715999FFE013}"/>
+              </a:ext>
+            </a:extLst>
+          </p:cNvPr>
+          <p:cNvPicPr>
+            <a:picLocks noGrp="1" noChangeAspect="1"/>
+          </p:cNvPicPr>
+          <p:nvPr>
+            <p:ph idx="1"/>
+          </p:nvPr>
+        </p:nvPicPr>
+        <p:blipFill>
+          <a:blip r:embed="rId2">
+            <a:extLst>
+              <a:ext uri="{28A0092B-C50C-407E-A947-70E740481C1C}">
+                <a14:useLocalDpi xmlns:a14="http://schemas.microsoft.com/office/drawing/2010/main" val="0"/>
+              </a:ext>
+            </a:extLst>
+          </a:blip>
+          <a:stretch>
+            <a:fillRect/>
+          </a:stretch>
+        </p:blipFill>
+        <p:spPr>
+          <a:xfrm>
+            <a:off x="685800" y="1530314"/>
+            <a:ext cx="7772400" cy="4025972"/>
+          </a:xfrm>
+        </p:spPr>
+      </p:pic>
+      <p:sp>
+        <p:nvSpPr>
+          <p:cNvPr id="4" name="灯片编号占位符 3">
+            <a:extLst>
+              <a:ext uri="{FF2B5EF4-FFF2-40B4-BE49-F238E27FC236}">
+                <a16:creationId xmlns:a16="http://schemas.microsoft.com/office/drawing/2014/main" id="{2262029F-AC96-72A3-5A4C-61C3D87E0C75}"/>
+              </a:ext>
+            </a:extLst>
+          </p:cNvPr>
+          <p:cNvSpPr>
+            <a:spLocks noGrp="1"/>
+          </p:cNvSpPr>
+          <p:nvPr>
+            <p:ph type="sldNum" sz="quarter" idx="12"/>
+          </p:nvPr>
+        </p:nvSpPr>
+        <p:spPr/>
+        <p:txBody>
+          <a:bodyPr/>
+          <a:lstStyle/>
+          <a:p>
+            <a:pPr>
+              <a:defRPr/>
+            </a:pPr>
+            <a:fld id="{A26A0649-E50C-4844-BD05-C05B747519B9}" type="slidenum">
+              <a:rPr lang="de-DE" altLang="en-US" smtClean="0"/>
+              <a:pPr>
+                <a:defRPr/>
+              </a:pPr>
+              <a:t>8</a:t>
+            </a:fld>
+            <a:endParaRPr lang="de-DE" altLang="en-US"/>
+          </a:p>
+        </p:txBody>
+      </p:sp>
+    </p:spTree>
+    <p:extLst>
+      <p:ext uri="{BB962C8B-B14F-4D97-AF65-F5344CB8AC3E}">
+        <p14:creationId xmlns:p14="http://schemas.microsoft.com/office/powerpoint/2010/main" val="94523218"/>
+      </p:ext>
+    </p:extLst>
+  </p:cSld>
+  <p:clrMapOvr>
+    <a:masterClrMapping/>
+  </p:clrMapOvr>
+</p:sld>
+</file>
+
+<file path=ppt/slides/slide9.xml><?xml version="1.0" encoding="utf-8"?>
+<p:sld xmlns:a="http://schemas.openxmlformats.org/drawingml/2006/main" xmlns:r="http://schemas.openxmlformats.org/officeDocument/2006/relationships" xmlns:p="http://schemas.openxmlformats.org/presentationml/2006/main">
+  <p:cSld>
+    <p:spTree>
+      <p:nvGrpSpPr>
+        <p:cNvPr id="1" name=""/>
+        <p:cNvGrpSpPr/>
+        <p:nvPr/>
+      </p:nvGrpSpPr>
+      <p:grpSpPr>
+        <a:xfrm>
+          <a:off x="0" y="0"/>
+          <a:ext cx="0" cy="0"/>
+          <a:chOff x="0" y="0"/>
+          <a:chExt cx="0" cy="0"/>
+        </a:xfrm>
+      </p:grpSpPr>
+      <p:sp>
+        <p:nvSpPr>
+          <p:cNvPr id="2" name="标题 1">
+            <a:extLst>
+              <a:ext uri="{FF2B5EF4-FFF2-40B4-BE49-F238E27FC236}">
+                <a16:creationId xmlns:a16="http://schemas.microsoft.com/office/drawing/2014/main" id="{EBE0E297-91EF-066D-47EF-BFE73830A7DB}"/>
+              </a:ext>
+            </a:extLst>
+          </p:cNvPr>
+          <p:cNvSpPr>
+            <a:spLocks noGrp="1"/>
+          </p:cNvSpPr>
+          <p:nvPr>
+            <p:ph type="title"/>
+          </p:nvPr>
+        </p:nvSpPr>
+        <p:spPr/>
+        <p:txBody>
+          <a:bodyPr/>
+          <a:lstStyle/>
+          <a:p>
+            <a:r>
+              <a:rPr lang="en-US" altLang="zh-CN" dirty="0"/>
+              <a:t>Sentinel-3B</a:t>
+            </a:r>
+            <a:endParaRPr lang="zh-CN" altLang="en-US" dirty="0"/>
+          </a:p>
+        </p:txBody>
+      </p:sp>
+      <p:pic>
+        <p:nvPicPr>
+          <p:cNvPr id="6" name="内容占位符 5" descr="图表&#10;&#10;描述已自动生成">
+            <a:extLst>
+              <a:ext uri="{FF2B5EF4-FFF2-40B4-BE49-F238E27FC236}">
+                <a16:creationId xmlns:a16="http://schemas.microsoft.com/office/drawing/2014/main" id="{ECD3FD61-A382-8299-A9B7-2B2CE0A984EE}"/>
+              </a:ext>
+            </a:extLst>
+          </p:cNvPr>
+          <p:cNvPicPr>
+            <a:picLocks noGrp="1" noChangeAspect="1"/>
+          </p:cNvPicPr>
+          <p:nvPr>
+            <p:ph idx="1"/>
+          </p:nvPr>
+        </p:nvPicPr>
+        <p:blipFill>
+          <a:blip r:embed="rId2">
+            <a:extLst>
+              <a:ext uri="{28A0092B-C50C-407E-A947-70E740481C1C}">
+                <a14:useLocalDpi xmlns:a14="http://schemas.microsoft.com/office/drawing/2010/main" val="0"/>
+              </a:ext>
+            </a:extLst>
+          </a:blip>
+          <a:stretch>
+            <a:fillRect/>
+          </a:stretch>
+        </p:blipFill>
+        <p:spPr>
+          <a:xfrm>
+            <a:off x="685800" y="1530314"/>
+            <a:ext cx="7772400" cy="4025972"/>
+          </a:xfrm>
+        </p:spPr>
+      </p:pic>
+      <p:sp>
+        <p:nvSpPr>
+          <p:cNvPr id="4" name="灯片编号占位符 3">
+            <a:extLst>
+              <a:ext uri="{FF2B5EF4-FFF2-40B4-BE49-F238E27FC236}">
+                <a16:creationId xmlns:a16="http://schemas.microsoft.com/office/drawing/2014/main" id="{2262029F-AC96-72A3-5A4C-61C3D87E0C75}"/>
+              </a:ext>
+            </a:extLst>
+          </p:cNvPr>
+          <p:cNvSpPr>
+            <a:spLocks noGrp="1"/>
+          </p:cNvSpPr>
+          <p:nvPr>
+            <p:ph type="sldNum" sz="quarter" idx="12"/>
+          </p:nvPr>
+        </p:nvSpPr>
+        <p:spPr/>
+        <p:txBody>
+          <a:bodyPr/>
+          <a:lstStyle/>
+          <a:p>
+            <a:pPr>
+              <a:defRPr/>
+            </a:pPr>
+            <a:fld id="{A26A0649-E50C-4844-BD05-C05B747519B9}" type="slidenum">
+              <a:rPr lang="de-DE" altLang="en-US" smtClean="0"/>
+              <a:pPr>
+                <a:defRPr/>
+              </a:pPr>
+              <a:t>9</a:t>
+            </a:fld>
+            <a:endParaRPr lang="de-DE" altLang="en-US"/>
+          </a:p>
+        </p:txBody>
+      </p:sp>
+    </p:spTree>
+    <p:extLst>
+      <p:ext uri="{BB962C8B-B14F-4D97-AF65-F5344CB8AC3E}">
+        <p14:creationId xmlns:p14="http://schemas.microsoft.com/office/powerpoint/2010/main" val="632559358"/>
+      </p:ext>
+    </p:extLst>
   </p:cSld>
   <p:clrMapOvr>
     <a:masterClrMapping/>

</xml_diff>